<commit_message>
seesion 6 final update
</commit_message>
<xml_diff>
--- a/session_6/autosynthesis_session6.pptx
+++ b/session_6/autosynthesis_session6.pptx
@@ -5,21 +5,22 @@
     <p:sldMasterId id="2147483648" r:id="rId1"/>
   </p:sldMasterIdLst>
   <p:notesMasterIdLst>
-    <p:notesMasterId r:id="rId11"/>
+    <p:notesMasterId r:id="rId12"/>
   </p:notesMasterIdLst>
   <p:handoutMasterIdLst>
-    <p:handoutMasterId r:id="rId12"/>
+    <p:handoutMasterId r:id="rId13"/>
   </p:handoutMasterIdLst>
   <p:sldIdLst>
     <p:sldId id="256" r:id="rId2"/>
     <p:sldId id="273" r:id="rId3"/>
-    <p:sldId id="274" r:id="rId4"/>
-    <p:sldId id="275" r:id="rId5"/>
-    <p:sldId id="276" r:id="rId6"/>
-    <p:sldId id="278" r:id="rId7"/>
-    <p:sldId id="277" r:id="rId8"/>
-    <p:sldId id="279" r:id="rId9"/>
-    <p:sldId id="280" r:id="rId10"/>
+    <p:sldId id="281" r:id="rId4"/>
+    <p:sldId id="274" r:id="rId5"/>
+    <p:sldId id="275" r:id="rId6"/>
+    <p:sldId id="276" r:id="rId7"/>
+    <p:sldId id="278" r:id="rId8"/>
+    <p:sldId id="277" r:id="rId9"/>
+    <p:sldId id="279" r:id="rId10"/>
+    <p:sldId id="280" r:id="rId11"/>
   </p:sldIdLst>
   <p:sldSz cx="9144000" cy="6858000" type="screen4x3"/>
   <p:notesSz cx="6858000" cy="9144000"/>
@@ -313,7 +314,7 @@
               <a:pPr>
                 <a:defRPr/>
               </a:pPr>
-              <a:t>21/05/2019</a:t>
+              <a:t>22/05/2019</a:t>
             </a:fld>
             <a:endParaRPr lang="en-GB"/>
           </a:p>
@@ -551,7 +552,7 @@
               <a:pPr>
                 <a:defRPr/>
               </a:pPr>
-              <a:t>21/05/2019</a:t>
+              <a:t>22/05/2019</a:t>
             </a:fld>
             <a:endParaRPr lang="en-GB"/>
           </a:p>
@@ -3381,1768 +3382,7 @@
 </p:sld>
 </file>
 
-<file path=ppt/slides/slide2.xml><?xml version="1.0" encoding="utf-8"?>
-<p:sld xmlns:a="http://schemas.openxmlformats.org/drawingml/2006/main" xmlns:r="http://schemas.openxmlformats.org/officeDocument/2006/relationships" xmlns:p="http://schemas.openxmlformats.org/presentationml/2006/main">
-  <p:cSld>
-    <p:spTree>
-      <p:nvGrpSpPr>
-        <p:cNvPr id="1" name=""/>
-        <p:cNvGrpSpPr/>
-        <p:nvPr/>
-      </p:nvGrpSpPr>
-      <p:grpSpPr>
-        <a:xfrm>
-          <a:off x="0" y="0"/>
-          <a:ext cx="0" cy="0"/>
-          <a:chOff x="0" y="0"/>
-          <a:chExt cx="0" cy="0"/>
-        </a:xfrm>
-      </p:grpSpPr>
-      <p:sp>
-        <p:nvSpPr>
-          <p:cNvPr id="2" name="Title 1">
-            <a:extLst>
-              <a:ext uri="{FF2B5EF4-FFF2-40B4-BE49-F238E27FC236}">
-                <a16:creationId xmlns:a16="http://schemas.microsoft.com/office/drawing/2014/main" id="{99696315-2ADD-47A6-93B0-FC710997F27C}"/>
-              </a:ext>
-            </a:extLst>
-          </p:cNvPr>
-          <p:cNvSpPr>
-            <a:spLocks noGrp="1"/>
-          </p:cNvSpPr>
-          <p:nvPr>
-            <p:ph type="title"/>
-          </p:nvPr>
-        </p:nvSpPr>
-        <p:spPr>
-          <a:xfrm>
-            <a:off x="365346" y="1595141"/>
-            <a:ext cx="8640960" cy="497989"/>
-          </a:xfrm>
-        </p:spPr>
-        <p:txBody>
-          <a:bodyPr>
-            <a:normAutofit fontScale="90000"/>
-          </a:bodyPr>
-          <a:lstStyle/>
-          <a:p>
-            <a:pPr algn="ctr"/>
-            <a:r>
-              <a:rPr lang="en-US"/>
-              <a:t>Recap of last session</a:t>
-            </a:r>
-          </a:p>
-          <a:p>
-            <a:endParaRPr lang="en-US" dirty="0"/>
-          </a:p>
-        </p:txBody>
-      </p:sp>
-      <p:sp>
-        <p:nvSpPr>
-          <p:cNvPr id="3" name="Content Placeholder 2">
-            <a:extLst>
-              <a:ext uri="{FF2B5EF4-FFF2-40B4-BE49-F238E27FC236}">
-                <a16:creationId xmlns:a16="http://schemas.microsoft.com/office/drawing/2014/main" id="{CA56E53C-4F8C-4282-82E1-AB3E8EBF09F4}"/>
-              </a:ext>
-            </a:extLst>
-          </p:cNvPr>
-          <p:cNvSpPr>
-            <a:spLocks noGrp="1"/>
-          </p:cNvSpPr>
-          <p:nvPr>
-            <p:ph idx="1"/>
-          </p:nvPr>
-        </p:nvSpPr>
-        <p:spPr>
-          <a:xfrm>
-            <a:off x="251520" y="1652566"/>
-            <a:ext cx="8640960" cy="4473598"/>
-          </a:xfrm>
-        </p:spPr>
-        <p:txBody>
-          <a:bodyPr/>
-          <a:lstStyle/>
-          <a:p>
-            <a:r>
-              <a:rPr lang="en-US">
-                <a:cs typeface="Calibri"/>
-              </a:rPr>
-              <a:t>Cross validation</a:t>
-            </a:r>
-          </a:p>
-          <a:p>
-            <a:pPr lvl="1"/>
-            <a:r>
-              <a:rPr lang="en-US">
-                <a:solidFill>
-                  <a:srgbClr val="000000"/>
-                </a:solidFill>
-                <a:cs typeface="Calibri"/>
-              </a:rPr>
-              <a:t>Meaning and types of cross validation</a:t>
-            </a:r>
-          </a:p>
-          <a:p>
-            <a:pPr lvl="1"/>
-            <a:r>
-              <a:rPr lang="en-US">
-                <a:solidFill>
-                  <a:srgbClr val="000000"/>
-                </a:solidFill>
-                <a:cs typeface="Calibri"/>
-              </a:rPr>
-              <a:t>Importance of cross validation </a:t>
-            </a:r>
-          </a:p>
-          <a:p>
-            <a:pPr lvl="1"/>
-            <a:r>
-              <a:rPr lang="en-US">
-                <a:solidFill>
-                  <a:srgbClr val="000000"/>
-                </a:solidFill>
-                <a:cs typeface="Calibri"/>
-              </a:rPr>
-              <a:t>Implementation </a:t>
-            </a:r>
-            <a:endParaRPr lang="en-US" dirty="0">
-              <a:solidFill>
-                <a:srgbClr val="000000"/>
-              </a:solidFill>
-              <a:cs typeface="Calibri"/>
-            </a:endParaRPr>
-          </a:p>
-        </p:txBody>
-      </p:sp>
-      <p:sp>
-        <p:nvSpPr>
-          <p:cNvPr id="4" name="Slide Number Placeholder 3">
-            <a:extLst>
-              <a:ext uri="{FF2B5EF4-FFF2-40B4-BE49-F238E27FC236}">
-                <a16:creationId xmlns:a16="http://schemas.microsoft.com/office/drawing/2014/main" id="{797A7A71-9C53-4E04-9A0A-B8BD62ACC52B}"/>
-              </a:ext>
-            </a:extLst>
-          </p:cNvPr>
-          <p:cNvSpPr>
-            <a:spLocks noGrp="1"/>
-          </p:cNvSpPr>
-          <p:nvPr>
-            <p:ph type="sldNum" sz="quarter" idx="10"/>
-          </p:nvPr>
-        </p:nvSpPr>
-        <p:spPr/>
-        <p:txBody>
-          <a:bodyPr/>
-          <a:lstStyle/>
-          <a:p>
-            <a:pPr>
-              <a:defRPr/>
-            </a:pPr>
-            <a:fld id="{953A5B41-6D74-47B9-8560-F73E964C6B20}" type="slidenum">
-              <a:rPr lang="en-GB" altLang="en-US"/>
-              <a:pPr>
-                <a:defRPr/>
-              </a:pPr>
-              <a:t>2</a:t>
-            </a:fld>
-            <a:endParaRPr lang="en-GB" altLang="en-US"/>
-          </a:p>
-        </p:txBody>
-      </p:sp>
-    </p:spTree>
-    <p:extLst>
-      <p:ext uri="{BB962C8B-B14F-4D97-AF65-F5344CB8AC3E}">
-        <p14:creationId xmlns:p14="http://schemas.microsoft.com/office/powerpoint/2010/main" val="2937506155"/>
-      </p:ext>
-    </p:extLst>
-  </p:cSld>
-  <p:clrMapOvr>
-    <a:masterClrMapping/>
-  </p:clrMapOvr>
-</p:sld>
-</file>
-
-<file path=ppt/slides/slide3.xml><?xml version="1.0" encoding="utf-8"?>
-<p:sld xmlns:a="http://schemas.openxmlformats.org/drawingml/2006/main" xmlns:r="http://schemas.openxmlformats.org/officeDocument/2006/relationships" xmlns:p="http://schemas.openxmlformats.org/presentationml/2006/main">
-  <p:cSld>
-    <p:spTree>
-      <p:nvGrpSpPr>
-        <p:cNvPr id="1" name=""/>
-        <p:cNvGrpSpPr/>
-        <p:nvPr/>
-      </p:nvGrpSpPr>
-      <p:grpSpPr>
-        <a:xfrm>
-          <a:off x="0" y="0"/>
-          <a:ext cx="0" cy="0"/>
-          <a:chOff x="0" y="0"/>
-          <a:chExt cx="0" cy="0"/>
-        </a:xfrm>
-      </p:grpSpPr>
-      <p:sp>
-        <p:nvSpPr>
-          <p:cNvPr id="2" name="Title 1">
-            <a:extLst>
-              <a:ext uri="{FF2B5EF4-FFF2-40B4-BE49-F238E27FC236}">
-                <a16:creationId xmlns:a16="http://schemas.microsoft.com/office/drawing/2014/main" id="{92A796FA-4BE7-4954-B3A8-D27334CE307D}"/>
-              </a:ext>
-            </a:extLst>
-          </p:cNvPr>
-          <p:cNvSpPr>
-            <a:spLocks noGrp="1"/>
-          </p:cNvSpPr>
-          <p:nvPr>
-            <p:ph type="title"/>
-          </p:nvPr>
-        </p:nvSpPr>
-        <p:spPr>
-          <a:xfrm>
-            <a:off x="298947" y="1149324"/>
-            <a:ext cx="8640960" cy="497988"/>
-          </a:xfrm>
-        </p:spPr>
-        <p:txBody>
-          <a:bodyPr>
-            <a:normAutofit fontScale="90000"/>
-          </a:bodyPr>
-          <a:lstStyle/>
-          <a:p>
-            <a:pPr algn="ctr"/>
-            <a:r>
-              <a:rPr lang="en-US">
-                <a:latin typeface="Arial"/>
-                <a:cs typeface="Arial"/>
-              </a:rPr>
-              <a:t>This session</a:t>
-            </a:r>
-            <a:endParaRPr lang="en-US"/>
-          </a:p>
-        </p:txBody>
-      </p:sp>
-      <p:sp>
-        <p:nvSpPr>
-          <p:cNvPr id="3" name="Content Placeholder 2">
-            <a:extLst>
-              <a:ext uri="{FF2B5EF4-FFF2-40B4-BE49-F238E27FC236}">
-                <a16:creationId xmlns:a16="http://schemas.microsoft.com/office/drawing/2014/main" id="{3139FAD8-3586-4FC6-BE08-EFD8AE136EEE}"/>
-              </a:ext>
-            </a:extLst>
-          </p:cNvPr>
-          <p:cNvSpPr>
-            <a:spLocks noGrp="1"/>
-          </p:cNvSpPr>
-          <p:nvPr>
-            <p:ph idx="1"/>
-          </p:nvPr>
-        </p:nvSpPr>
-        <p:spPr>
-          <a:xfrm>
-            <a:off x="251520" y="1595653"/>
-            <a:ext cx="8640960" cy="4530511"/>
-          </a:xfrm>
-        </p:spPr>
-        <p:txBody>
-          <a:bodyPr/>
-          <a:lstStyle/>
-          <a:p>
-            <a:r>
-              <a:rPr lang="en-US">
-                <a:cs typeface="Calibri"/>
-              </a:rPr>
-              <a:t>Parameter tuning</a:t>
-            </a:r>
-          </a:p>
-          <a:p>
-            <a:pPr lvl="1"/>
-            <a:r>
-              <a:rPr lang="en-US">
-                <a:solidFill>
-                  <a:srgbClr val="000000"/>
-                </a:solidFill>
-                <a:cs typeface="Calibri"/>
-              </a:rPr>
-              <a:t>Grid search</a:t>
-            </a:r>
-          </a:p>
-          <a:p>
-            <a:pPr lvl="1"/>
-            <a:r>
-              <a:rPr lang="en-US">
-                <a:solidFill>
-                  <a:srgbClr val="000000"/>
-                </a:solidFill>
-                <a:cs typeface="Calibri"/>
-              </a:rPr>
-              <a:t>Cross validation</a:t>
-            </a:r>
-            <a:endParaRPr lang="en-US" dirty="0">
-              <a:solidFill>
-                <a:srgbClr val="000000"/>
-              </a:solidFill>
-              <a:cs typeface="Calibri"/>
-            </a:endParaRPr>
-          </a:p>
-          <a:p>
-            <a:pPr lvl="1"/>
-            <a:r>
-              <a:rPr lang="en-US">
-                <a:solidFill>
-                  <a:srgbClr val="000000"/>
-                </a:solidFill>
-                <a:cs typeface="Calibri"/>
-              </a:rPr>
-              <a:t>Pipelining </a:t>
-            </a:r>
-            <a:endParaRPr lang="en-US" dirty="0">
-              <a:solidFill>
-                <a:srgbClr val="000000"/>
-              </a:solidFill>
-              <a:cs typeface="Calibri"/>
-            </a:endParaRPr>
-          </a:p>
-        </p:txBody>
-      </p:sp>
-      <p:sp>
-        <p:nvSpPr>
-          <p:cNvPr id="4" name="Slide Number Placeholder 3">
-            <a:extLst>
-              <a:ext uri="{FF2B5EF4-FFF2-40B4-BE49-F238E27FC236}">
-                <a16:creationId xmlns:a16="http://schemas.microsoft.com/office/drawing/2014/main" id="{334EA053-1C8C-42CF-B907-DE93FEEC1DF9}"/>
-              </a:ext>
-            </a:extLst>
-          </p:cNvPr>
-          <p:cNvSpPr>
-            <a:spLocks noGrp="1"/>
-          </p:cNvSpPr>
-          <p:nvPr>
-            <p:ph type="sldNum" sz="quarter" idx="10"/>
-          </p:nvPr>
-        </p:nvSpPr>
-        <p:spPr/>
-        <p:txBody>
-          <a:bodyPr/>
-          <a:lstStyle/>
-          <a:p>
-            <a:pPr>
-              <a:defRPr/>
-            </a:pPr>
-            <a:fld id="{953A5B41-6D74-47B9-8560-F73E964C6B20}" type="slidenum">
-              <a:rPr lang="en-GB" altLang="en-US"/>
-              <a:pPr>
-                <a:defRPr/>
-              </a:pPr>
-              <a:t>3</a:t>
-            </a:fld>
-            <a:endParaRPr lang="en-GB" altLang="en-US"/>
-          </a:p>
-        </p:txBody>
-      </p:sp>
-    </p:spTree>
-    <p:extLst>
-      <p:ext uri="{BB962C8B-B14F-4D97-AF65-F5344CB8AC3E}">
-        <p14:creationId xmlns:p14="http://schemas.microsoft.com/office/powerpoint/2010/main" val="2968239713"/>
-      </p:ext>
-    </p:extLst>
-  </p:cSld>
-  <p:clrMapOvr>
-    <a:masterClrMapping/>
-  </p:clrMapOvr>
-</p:sld>
-</file>
-
-<file path=ppt/slides/slide4.xml><?xml version="1.0" encoding="utf-8"?>
-<p:sld xmlns:a="http://schemas.openxmlformats.org/drawingml/2006/main" xmlns:r="http://schemas.openxmlformats.org/officeDocument/2006/relationships" xmlns:p="http://schemas.openxmlformats.org/presentationml/2006/main">
-  <p:cSld>
-    <p:spTree>
-      <p:nvGrpSpPr>
-        <p:cNvPr id="1" name=""/>
-        <p:cNvGrpSpPr/>
-        <p:nvPr/>
-      </p:nvGrpSpPr>
-      <p:grpSpPr>
-        <a:xfrm>
-          <a:off x="0" y="0"/>
-          <a:ext cx="0" cy="0"/>
-          <a:chOff x="0" y="0"/>
-          <a:chExt cx="0" cy="0"/>
-        </a:xfrm>
-      </p:grpSpPr>
-      <p:sp>
-        <p:nvSpPr>
-          <p:cNvPr id="2" name="Title 1">
-            <a:extLst>
-              <a:ext uri="{FF2B5EF4-FFF2-40B4-BE49-F238E27FC236}">
-                <a16:creationId xmlns:a16="http://schemas.microsoft.com/office/drawing/2014/main" id="{A27934E1-92EF-467F-AAF8-17C8CF8D73DE}"/>
-              </a:ext>
-            </a:extLst>
-          </p:cNvPr>
-          <p:cNvSpPr>
-            <a:spLocks noGrp="1"/>
-          </p:cNvSpPr>
-          <p:nvPr>
-            <p:ph type="title"/>
-          </p:nvPr>
-        </p:nvSpPr>
-        <p:spPr>
-          <a:xfrm>
-            <a:off x="251520" y="1196752"/>
-            <a:ext cx="8640960" cy="479017"/>
-          </a:xfrm>
-        </p:spPr>
-        <p:txBody>
-          <a:bodyPr>
-            <a:normAutofit fontScale="90000"/>
-          </a:bodyPr>
-          <a:lstStyle/>
-          <a:p>
-            <a:pPr algn="ctr"/>
-            <a:r>
-              <a:rPr lang="en-US">
-                <a:latin typeface="Arial"/>
-                <a:cs typeface="Arial"/>
-              </a:rPr>
-              <a:t>Parameter tuning</a:t>
-            </a:r>
-            <a:endParaRPr lang="en-US"/>
-          </a:p>
-        </p:txBody>
-      </p:sp>
-      <p:sp>
-        <p:nvSpPr>
-          <p:cNvPr id="3" name="Content Placeholder 2">
-            <a:extLst>
-              <a:ext uri="{FF2B5EF4-FFF2-40B4-BE49-F238E27FC236}">
-                <a16:creationId xmlns:a16="http://schemas.microsoft.com/office/drawing/2014/main" id="{709C60CB-DC09-46BC-81EE-61731BAFB739}"/>
-              </a:ext>
-            </a:extLst>
-          </p:cNvPr>
-          <p:cNvSpPr>
-            <a:spLocks noGrp="1"/>
-          </p:cNvSpPr>
-          <p:nvPr>
-            <p:ph idx="1"/>
-          </p:nvPr>
-        </p:nvSpPr>
-        <p:spPr>
-          <a:xfrm>
-            <a:off x="251520" y="1718964"/>
-            <a:ext cx="8640960" cy="4407200"/>
-          </a:xfrm>
-        </p:spPr>
-        <p:txBody>
-          <a:bodyPr/>
-          <a:lstStyle/>
-          <a:p>
-            <a:r>
-              <a:rPr lang="en-US">
-                <a:cs typeface="Calibri"/>
-              </a:rPr>
-              <a:t>Each algorithm has multiple parameters</a:t>
-            </a:r>
-          </a:p>
-          <a:p>
-            <a:r>
-              <a:rPr lang="en-US">
-                <a:cs typeface="Calibri"/>
-              </a:rPr>
-              <a:t>Each parameter can (in most cases) take on multiple options</a:t>
-            </a:r>
-          </a:p>
-          <a:p>
-            <a:r>
-              <a:rPr lang="en-US">
-                <a:cs typeface="Calibri"/>
-              </a:rPr>
-              <a:t>Optimal combination of these parameters is key to obtaining an optimal model</a:t>
-            </a:r>
-            <a:endParaRPr lang="en-US" dirty="0">
-              <a:cs typeface="Calibri"/>
-            </a:endParaRPr>
-          </a:p>
-          <a:p>
-            <a:r>
-              <a:rPr lang="en-US">
-                <a:cs typeface="Calibri"/>
-              </a:rPr>
-              <a:t>But all possible combination of these parameter choices is practically in-exhaustible</a:t>
-            </a:r>
-            <a:endParaRPr lang="en-US" dirty="0">
-              <a:cs typeface="Calibri"/>
-            </a:endParaRPr>
-          </a:p>
-        </p:txBody>
-      </p:sp>
-      <p:sp>
-        <p:nvSpPr>
-          <p:cNvPr id="4" name="Slide Number Placeholder 3">
-            <a:extLst>
-              <a:ext uri="{FF2B5EF4-FFF2-40B4-BE49-F238E27FC236}">
-                <a16:creationId xmlns:a16="http://schemas.microsoft.com/office/drawing/2014/main" id="{4AD703BF-806E-4285-8375-CB1E1E2B7392}"/>
-              </a:ext>
-            </a:extLst>
-          </p:cNvPr>
-          <p:cNvSpPr>
-            <a:spLocks noGrp="1"/>
-          </p:cNvSpPr>
-          <p:nvPr>
-            <p:ph type="sldNum" sz="quarter" idx="10"/>
-          </p:nvPr>
-        </p:nvSpPr>
-        <p:spPr/>
-        <p:txBody>
-          <a:bodyPr/>
-          <a:lstStyle/>
-          <a:p>
-            <a:pPr>
-              <a:defRPr/>
-            </a:pPr>
-            <a:fld id="{953A5B41-6D74-47B9-8560-F73E964C6B20}" type="slidenum">
-              <a:rPr lang="en-GB" altLang="en-US"/>
-              <a:pPr>
-                <a:defRPr/>
-              </a:pPr>
-              <a:t>4</a:t>
-            </a:fld>
-            <a:endParaRPr lang="en-GB" altLang="en-US"/>
-          </a:p>
-        </p:txBody>
-      </p:sp>
-    </p:spTree>
-    <p:extLst>
-      <p:ext uri="{BB962C8B-B14F-4D97-AF65-F5344CB8AC3E}">
-        <p14:creationId xmlns:p14="http://schemas.microsoft.com/office/powerpoint/2010/main" val="1060563233"/>
-      </p:ext>
-    </p:extLst>
-  </p:cSld>
-  <p:clrMapOvr>
-    <a:masterClrMapping/>
-  </p:clrMapOvr>
-</p:sld>
-</file>
-
-<file path=ppt/slides/slide5.xml><?xml version="1.0" encoding="utf-8"?>
-<p:sld xmlns:a="http://schemas.openxmlformats.org/drawingml/2006/main" xmlns:r="http://schemas.openxmlformats.org/officeDocument/2006/relationships" xmlns:p="http://schemas.openxmlformats.org/presentationml/2006/main">
-  <p:cSld>
-    <p:spTree>
-      <p:nvGrpSpPr>
-        <p:cNvPr id="1" name=""/>
-        <p:cNvGrpSpPr/>
-        <p:nvPr/>
-      </p:nvGrpSpPr>
-      <p:grpSpPr>
-        <a:xfrm>
-          <a:off x="0" y="0"/>
-          <a:ext cx="0" cy="0"/>
-          <a:chOff x="0" y="0"/>
-          <a:chExt cx="0" cy="0"/>
-        </a:xfrm>
-      </p:grpSpPr>
-      <p:sp>
-        <p:nvSpPr>
-          <p:cNvPr id="2" name="Title 1">
-            <a:extLst>
-              <a:ext uri="{FF2B5EF4-FFF2-40B4-BE49-F238E27FC236}">
-                <a16:creationId xmlns:a16="http://schemas.microsoft.com/office/drawing/2014/main" id="{B5EC141B-C2EB-44E3-91ED-8C54C55946E8}"/>
-              </a:ext>
-            </a:extLst>
-          </p:cNvPr>
-          <p:cNvSpPr>
-            <a:spLocks noGrp="1"/>
-          </p:cNvSpPr>
-          <p:nvPr>
-            <p:ph type="title"/>
-          </p:nvPr>
-        </p:nvSpPr>
-        <p:spPr>
-          <a:xfrm>
-            <a:off x="251520" y="1196752"/>
-            <a:ext cx="8640960" cy="507474"/>
-          </a:xfrm>
-        </p:spPr>
-        <p:txBody>
-          <a:bodyPr>
-            <a:normAutofit fontScale="90000"/>
-          </a:bodyPr>
-          <a:lstStyle/>
-          <a:p>
-            <a:pPr algn="ctr"/>
-            <a:r>
-              <a:rPr lang="en-US">
-                <a:latin typeface="Arial"/>
-                <a:cs typeface="Arial"/>
-              </a:rPr>
-              <a:t>Parameters example</a:t>
-            </a:r>
-            <a:endParaRPr lang="en-US"/>
-          </a:p>
-        </p:txBody>
-      </p:sp>
-      <p:sp>
-        <p:nvSpPr>
-          <p:cNvPr id="3" name="Content Placeholder 2">
-            <a:extLst>
-              <a:ext uri="{FF2B5EF4-FFF2-40B4-BE49-F238E27FC236}">
-                <a16:creationId xmlns:a16="http://schemas.microsoft.com/office/drawing/2014/main" id="{A63D06AA-6810-47CA-A223-02833B308F4B}"/>
-              </a:ext>
-            </a:extLst>
-          </p:cNvPr>
-          <p:cNvSpPr>
-            <a:spLocks noGrp="1"/>
-          </p:cNvSpPr>
-          <p:nvPr>
-            <p:ph idx="1"/>
-          </p:nvPr>
-        </p:nvSpPr>
-        <p:spPr>
-          <a:xfrm>
-            <a:off x="251520" y="1747421"/>
-            <a:ext cx="8640960" cy="4378743"/>
-          </a:xfrm>
-        </p:spPr>
-        <p:txBody>
-          <a:bodyPr/>
-          <a:lstStyle/>
-          <a:p>
-            <a:r>
-              <a:rPr lang="en-US">
-                <a:cs typeface="Calibri"/>
-              </a:rPr>
-              <a:t>An example of the support vector machine implementation in sklearn</a:t>
-            </a:r>
-          </a:p>
-          <a:p>
-            <a:pPr lvl="1"/>
-            <a:r>
-              <a:rPr lang="en-US" i="1">
-                <a:ea typeface="+mn-lt"/>
-                <a:cs typeface="+mn-lt"/>
-              </a:rPr>
-              <a:t>class </a:t>
-            </a:r>
-            <a:r>
-              <a:rPr lang="en-US">
-                <a:ea typeface="+mn-lt"/>
-                <a:cs typeface="+mn-lt"/>
-              </a:rPr>
-              <a:t>sklearn.svm.SVC(</a:t>
-            </a:r>
-            <a:r>
-              <a:rPr lang="en-US" i="1">
-                <a:ea typeface="+mn-lt"/>
-                <a:cs typeface="+mn-lt"/>
-              </a:rPr>
-              <a:t>C=1.0</a:t>
-            </a:r>
-            <a:r>
-              <a:rPr lang="en-US">
-                <a:ea typeface="+mn-lt"/>
-                <a:cs typeface="+mn-lt"/>
-              </a:rPr>
-              <a:t>, </a:t>
-            </a:r>
-            <a:r>
-              <a:rPr lang="en-US" i="1">
-                <a:ea typeface="+mn-lt"/>
-                <a:cs typeface="+mn-lt"/>
-              </a:rPr>
-              <a:t>kernel=’rbf’</a:t>
-            </a:r>
-            <a:r>
-              <a:rPr lang="en-US">
-                <a:ea typeface="+mn-lt"/>
-                <a:cs typeface="+mn-lt"/>
-              </a:rPr>
-              <a:t>, </a:t>
-            </a:r>
-            <a:r>
-              <a:rPr lang="en-US" i="1">
-                <a:ea typeface="+mn-lt"/>
-                <a:cs typeface="+mn-lt"/>
-              </a:rPr>
-              <a:t>degree=3</a:t>
-            </a:r>
-            <a:r>
-              <a:rPr lang="en-US">
-                <a:ea typeface="+mn-lt"/>
-                <a:cs typeface="+mn-lt"/>
-              </a:rPr>
-              <a:t>, </a:t>
-            </a:r>
-            <a:r>
-              <a:rPr lang="en-US" i="1">
-                <a:ea typeface="+mn-lt"/>
-                <a:cs typeface="+mn-lt"/>
-              </a:rPr>
-              <a:t>gamma=’auto_deprecated’</a:t>
-            </a:r>
-            <a:r>
-              <a:rPr lang="en-US">
-                <a:ea typeface="+mn-lt"/>
-                <a:cs typeface="+mn-lt"/>
-              </a:rPr>
-              <a:t>, </a:t>
-            </a:r>
-            <a:r>
-              <a:rPr lang="en-US" i="1">
-                <a:ea typeface="+mn-lt"/>
-                <a:cs typeface="+mn-lt"/>
-              </a:rPr>
-              <a:t>coef0=0.0</a:t>
-            </a:r>
-            <a:r>
-              <a:rPr lang="en-US">
-                <a:ea typeface="+mn-lt"/>
-                <a:cs typeface="+mn-lt"/>
-              </a:rPr>
-              <a:t>, </a:t>
-            </a:r>
-            <a:r>
-              <a:rPr lang="en-US" i="1">
-                <a:ea typeface="+mn-lt"/>
-                <a:cs typeface="+mn-lt"/>
-              </a:rPr>
-              <a:t>shrinking=True</a:t>
-            </a:r>
-            <a:r>
-              <a:rPr lang="en-US">
-                <a:ea typeface="+mn-lt"/>
-                <a:cs typeface="+mn-lt"/>
-              </a:rPr>
-              <a:t>, </a:t>
-            </a:r>
-            <a:r>
-              <a:rPr lang="en-US" i="1">
-                <a:ea typeface="+mn-lt"/>
-                <a:cs typeface="+mn-lt"/>
-              </a:rPr>
-              <a:t>probability=False</a:t>
-            </a:r>
-            <a:r>
-              <a:rPr lang="en-US">
-                <a:ea typeface="+mn-lt"/>
-                <a:cs typeface="+mn-lt"/>
-              </a:rPr>
-              <a:t>, </a:t>
-            </a:r>
-            <a:r>
-              <a:rPr lang="en-US" i="1">
-                <a:ea typeface="+mn-lt"/>
-                <a:cs typeface="+mn-lt"/>
-              </a:rPr>
-              <a:t>tol=0.001</a:t>
-            </a:r>
-            <a:r>
-              <a:rPr lang="en-US">
-                <a:ea typeface="+mn-lt"/>
-                <a:cs typeface="+mn-lt"/>
-              </a:rPr>
-              <a:t>, </a:t>
-            </a:r>
-            <a:r>
-              <a:rPr lang="en-US" i="1">
-                <a:ea typeface="+mn-lt"/>
-                <a:cs typeface="+mn-lt"/>
-              </a:rPr>
-              <a:t>cache_size=200</a:t>
-            </a:r>
-            <a:r>
-              <a:rPr lang="en-US">
-                <a:ea typeface="+mn-lt"/>
-                <a:cs typeface="+mn-lt"/>
-              </a:rPr>
-              <a:t>, </a:t>
-            </a:r>
-            <a:r>
-              <a:rPr lang="en-US" i="1">
-                <a:ea typeface="+mn-lt"/>
-                <a:cs typeface="+mn-lt"/>
-              </a:rPr>
-              <a:t>class_weight=None</a:t>
-            </a:r>
-            <a:r>
-              <a:rPr lang="en-US">
-                <a:ea typeface="+mn-lt"/>
-                <a:cs typeface="+mn-lt"/>
-              </a:rPr>
-              <a:t>, </a:t>
-            </a:r>
-            <a:r>
-              <a:rPr lang="en-US" i="1">
-                <a:ea typeface="+mn-lt"/>
-                <a:cs typeface="+mn-lt"/>
-              </a:rPr>
-              <a:t>verbose=False</a:t>
-            </a:r>
-            <a:r>
-              <a:rPr lang="en-US">
-                <a:ea typeface="+mn-lt"/>
-                <a:cs typeface="+mn-lt"/>
-              </a:rPr>
-              <a:t>, </a:t>
-            </a:r>
-            <a:r>
-              <a:rPr lang="en-US" i="1">
-                <a:ea typeface="+mn-lt"/>
-                <a:cs typeface="+mn-lt"/>
-              </a:rPr>
-              <a:t>max_iter=-1</a:t>
-            </a:r>
-            <a:r>
-              <a:rPr lang="en-US">
-                <a:ea typeface="+mn-lt"/>
-                <a:cs typeface="+mn-lt"/>
-              </a:rPr>
-              <a:t>, </a:t>
-            </a:r>
-            <a:r>
-              <a:rPr lang="en-US" i="1">
-                <a:ea typeface="+mn-lt"/>
-                <a:cs typeface="+mn-lt"/>
-              </a:rPr>
-              <a:t>decision_function_shape=’ovr’</a:t>
-            </a:r>
-            <a:r>
-              <a:rPr lang="en-US">
-                <a:ea typeface="+mn-lt"/>
-                <a:cs typeface="+mn-lt"/>
-              </a:rPr>
-              <a:t>, </a:t>
-            </a:r>
-            <a:r>
-              <a:rPr lang="en-US" i="1">
-                <a:ea typeface="+mn-lt"/>
-                <a:cs typeface="+mn-lt"/>
-              </a:rPr>
-              <a:t>random_state=None</a:t>
-            </a:r>
-            <a:r>
-              <a:rPr lang="en-US">
-                <a:ea typeface="+mn-lt"/>
-                <a:cs typeface="+mn-lt"/>
-              </a:rPr>
-              <a:t>)</a:t>
-            </a:r>
-            <a:endParaRPr lang="en-US" dirty="0">
-              <a:cs typeface="Calibri"/>
-            </a:endParaRPr>
-          </a:p>
-        </p:txBody>
-      </p:sp>
-      <p:sp>
-        <p:nvSpPr>
-          <p:cNvPr id="4" name="Slide Number Placeholder 3">
-            <a:extLst>
-              <a:ext uri="{FF2B5EF4-FFF2-40B4-BE49-F238E27FC236}">
-                <a16:creationId xmlns:a16="http://schemas.microsoft.com/office/drawing/2014/main" id="{4DF14D75-0536-4471-8E0C-A6F8029DE145}"/>
-              </a:ext>
-            </a:extLst>
-          </p:cNvPr>
-          <p:cNvSpPr>
-            <a:spLocks noGrp="1"/>
-          </p:cNvSpPr>
-          <p:nvPr>
-            <p:ph type="sldNum" sz="quarter" idx="10"/>
-          </p:nvPr>
-        </p:nvSpPr>
-        <p:spPr/>
-        <p:txBody>
-          <a:bodyPr/>
-          <a:lstStyle/>
-          <a:p>
-            <a:pPr>
-              <a:defRPr/>
-            </a:pPr>
-            <a:fld id="{953A5B41-6D74-47B9-8560-F73E964C6B20}" type="slidenum">
-              <a:rPr lang="en-GB" altLang="en-US"/>
-              <a:pPr>
-                <a:defRPr/>
-              </a:pPr>
-              <a:t>5</a:t>
-            </a:fld>
-            <a:endParaRPr lang="en-GB" altLang="en-US"/>
-          </a:p>
-        </p:txBody>
-      </p:sp>
-    </p:spTree>
-    <p:extLst>
-      <p:ext uri="{BB962C8B-B14F-4D97-AF65-F5344CB8AC3E}">
-        <p14:creationId xmlns:p14="http://schemas.microsoft.com/office/powerpoint/2010/main" val="2724080666"/>
-      </p:ext>
-    </p:extLst>
-  </p:cSld>
-  <p:clrMapOvr>
-    <a:masterClrMapping/>
-  </p:clrMapOvr>
-</p:sld>
-</file>
-
-<file path=ppt/slides/slide6.xml><?xml version="1.0" encoding="utf-8"?>
-<p:sld xmlns:a="http://schemas.openxmlformats.org/drawingml/2006/main" xmlns:r="http://schemas.openxmlformats.org/officeDocument/2006/relationships" xmlns:p="http://schemas.openxmlformats.org/presentationml/2006/main">
-  <p:cSld>
-    <p:spTree>
-      <p:nvGrpSpPr>
-        <p:cNvPr id="1" name=""/>
-        <p:cNvGrpSpPr/>
-        <p:nvPr/>
-      </p:nvGrpSpPr>
-      <p:grpSpPr>
-        <a:xfrm>
-          <a:off x="0" y="0"/>
-          <a:ext cx="0" cy="0"/>
-          <a:chOff x="0" y="0"/>
-          <a:chExt cx="0" cy="0"/>
-        </a:xfrm>
-      </p:grpSpPr>
-      <p:sp>
-        <p:nvSpPr>
-          <p:cNvPr id="2" name="Content Placeholder 1">
-            <a:extLst>
-              <a:ext uri="{FF2B5EF4-FFF2-40B4-BE49-F238E27FC236}">
-                <a16:creationId xmlns:a16="http://schemas.microsoft.com/office/drawing/2014/main" id="{3E46F840-00AF-47D6-B550-BA72CF7314C1}"/>
-              </a:ext>
-            </a:extLst>
-          </p:cNvPr>
-          <p:cNvSpPr>
-            <a:spLocks noGrp="1"/>
-          </p:cNvSpPr>
-          <p:nvPr>
-            <p:ph sz="half" idx="1"/>
-          </p:nvPr>
-        </p:nvSpPr>
-        <p:spPr>
-          <a:xfrm>
-            <a:off x="457200" y="1583515"/>
-            <a:ext cx="4038600" cy="4355225"/>
-          </a:xfrm>
-        </p:spPr>
-        <p:txBody>
-          <a:bodyPr/>
-          <a:lstStyle/>
-          <a:p>
-            <a:r>
-              <a:rPr lang="en-US" b="1">
-                <a:ea typeface="+mn-lt"/>
-                <a:cs typeface="+mn-lt"/>
-              </a:rPr>
-              <a:t>C</a:t>
-            </a:r>
-            <a:r>
-              <a:rPr lang="en-US">
-                <a:ea typeface="+mn-lt"/>
-                <a:cs typeface="+mn-lt"/>
-              </a:rPr>
-              <a:t> : float</a:t>
-            </a:r>
-            <a:endParaRPr lang="en-US">
-              <a:cs typeface="Calibri"/>
-            </a:endParaRPr>
-          </a:p>
-          <a:p>
-            <a:r>
-              <a:rPr lang="en-US" b="1">
-                <a:ea typeface="+mn-lt"/>
-                <a:cs typeface="+mn-lt"/>
-              </a:rPr>
-              <a:t>kernel</a:t>
-            </a:r>
-            <a:r>
-              <a:rPr lang="en-US">
-                <a:ea typeface="+mn-lt"/>
-                <a:cs typeface="+mn-lt"/>
-              </a:rPr>
-              <a:t> : string</a:t>
-            </a:r>
-            <a:endParaRPr lang="en-US">
-              <a:cs typeface="Calibri"/>
-            </a:endParaRPr>
-          </a:p>
-          <a:p>
-            <a:r>
-              <a:rPr lang="en-US" b="1">
-                <a:ea typeface="+mn-lt"/>
-                <a:cs typeface="+mn-lt"/>
-              </a:rPr>
-              <a:t>degree</a:t>
-            </a:r>
-            <a:r>
-              <a:rPr lang="en-US">
-                <a:ea typeface="+mn-lt"/>
-                <a:cs typeface="+mn-lt"/>
-              </a:rPr>
-              <a:t> : int</a:t>
-            </a:r>
-            <a:endParaRPr lang="en-US">
-              <a:cs typeface="Calibri"/>
-            </a:endParaRPr>
-          </a:p>
-          <a:p>
-            <a:r>
-              <a:rPr lang="en-US" b="1">
-                <a:ea typeface="+mn-lt"/>
-                <a:cs typeface="+mn-lt"/>
-              </a:rPr>
-              <a:t>gamma</a:t>
-            </a:r>
-            <a:r>
-              <a:rPr lang="en-US">
-                <a:ea typeface="+mn-lt"/>
-                <a:cs typeface="+mn-lt"/>
-              </a:rPr>
-              <a:t> : float </a:t>
-            </a:r>
-            <a:endParaRPr lang="en-US" dirty="0">
-              <a:ea typeface="+mn-lt"/>
-              <a:cs typeface="+mn-lt"/>
-            </a:endParaRPr>
-          </a:p>
-          <a:p>
-            <a:r>
-              <a:rPr lang="en-US" b="1">
-                <a:ea typeface="+mn-lt"/>
-                <a:cs typeface="+mn-lt"/>
-              </a:rPr>
-              <a:t>coef0</a:t>
-            </a:r>
-            <a:r>
-              <a:rPr lang="en-US">
-                <a:ea typeface="+mn-lt"/>
-                <a:cs typeface="+mn-lt"/>
-              </a:rPr>
-              <a:t> : float</a:t>
-            </a:r>
-            <a:endParaRPr lang="en-US" dirty="0">
-              <a:cs typeface="Calibri"/>
-            </a:endParaRPr>
-          </a:p>
-          <a:p>
-            <a:r>
-              <a:rPr lang="en-US" b="1">
-                <a:ea typeface="+mn-lt"/>
-                <a:cs typeface="+mn-lt"/>
-              </a:rPr>
-              <a:t>shrinking</a:t>
-            </a:r>
-            <a:r>
-              <a:rPr lang="en-US">
-                <a:ea typeface="+mn-lt"/>
-                <a:cs typeface="+mn-lt"/>
-              </a:rPr>
-              <a:t> : boolean</a:t>
-            </a:r>
-            <a:endParaRPr lang="en-US" dirty="0">
-              <a:cs typeface="Calibri"/>
-            </a:endParaRPr>
-          </a:p>
-          <a:p>
-            <a:r>
-              <a:rPr lang="en-US" b="1">
-                <a:ea typeface="+mn-lt"/>
-                <a:cs typeface="+mn-lt"/>
-              </a:rPr>
-              <a:t>random_state</a:t>
-            </a:r>
-            <a:r>
-              <a:rPr lang="en-US">
-                <a:ea typeface="+mn-lt"/>
-                <a:cs typeface="+mn-lt"/>
-              </a:rPr>
-              <a:t> : int</a:t>
-            </a:r>
-            <a:endParaRPr lang="en-US" dirty="0">
-              <a:ea typeface="+mn-lt"/>
-              <a:cs typeface="+mn-lt"/>
-            </a:endParaRPr>
-          </a:p>
-          <a:p>
-            <a:endParaRPr lang="en-US" dirty="0">
-              <a:cs typeface="Calibri"/>
-            </a:endParaRPr>
-          </a:p>
-        </p:txBody>
-      </p:sp>
-      <p:sp>
-        <p:nvSpPr>
-          <p:cNvPr id="3" name="Content Placeholder 2">
-            <a:extLst>
-              <a:ext uri="{FF2B5EF4-FFF2-40B4-BE49-F238E27FC236}">
-                <a16:creationId xmlns:a16="http://schemas.microsoft.com/office/drawing/2014/main" id="{B111964B-DDD2-4AF0-B15A-1AFD5E191B07}"/>
-              </a:ext>
-            </a:extLst>
-          </p:cNvPr>
-          <p:cNvSpPr>
-            <a:spLocks noGrp="1"/>
-          </p:cNvSpPr>
-          <p:nvPr>
-            <p:ph sz="half" idx="2"/>
-          </p:nvPr>
-        </p:nvSpPr>
-        <p:spPr>
-          <a:xfrm>
-            <a:off x="4648200" y="1583515"/>
-            <a:ext cx="4038600" cy="4355225"/>
-          </a:xfrm>
-        </p:spPr>
-        <p:txBody>
-          <a:bodyPr/>
-          <a:lstStyle/>
-          <a:p>
-            <a:r>
-              <a:rPr lang="en-US" b="1">
-                <a:ea typeface="+mn-lt"/>
-                <a:cs typeface="+mn-lt"/>
-              </a:rPr>
-              <a:t>probability</a:t>
-            </a:r>
-            <a:r>
-              <a:rPr lang="en-US">
-                <a:ea typeface="+mn-lt"/>
-                <a:cs typeface="+mn-lt"/>
-              </a:rPr>
-              <a:t> : boolean</a:t>
-            </a:r>
-          </a:p>
-          <a:p>
-            <a:r>
-              <a:rPr lang="en-US" b="1">
-                <a:ea typeface="+mn-lt"/>
-                <a:cs typeface="+mn-lt"/>
-              </a:rPr>
-              <a:t>tol</a:t>
-            </a:r>
-            <a:r>
-              <a:rPr lang="en-US">
-                <a:ea typeface="+mn-lt"/>
-                <a:cs typeface="+mn-lt"/>
-              </a:rPr>
-              <a:t> : float</a:t>
-            </a:r>
-            <a:endParaRPr lang="en-US" dirty="0">
-              <a:ea typeface="+mn-lt"/>
-              <a:cs typeface="+mn-lt"/>
-            </a:endParaRPr>
-          </a:p>
-          <a:p>
-            <a:r>
-              <a:rPr lang="en-US" b="1">
-                <a:ea typeface="+mn-lt"/>
-                <a:cs typeface="+mn-lt"/>
-              </a:rPr>
-              <a:t>cache_size</a:t>
-            </a:r>
-            <a:r>
-              <a:rPr lang="en-US">
-                <a:ea typeface="+mn-lt"/>
-                <a:cs typeface="+mn-lt"/>
-              </a:rPr>
-              <a:t> : float</a:t>
-            </a:r>
-          </a:p>
-          <a:p>
-            <a:r>
-              <a:rPr lang="en-US" b="1">
-                <a:ea typeface="+mn-lt"/>
-                <a:cs typeface="+mn-lt"/>
-              </a:rPr>
-              <a:t>class_weight</a:t>
-            </a:r>
-            <a:r>
-              <a:rPr lang="en-US">
-                <a:ea typeface="+mn-lt"/>
-                <a:cs typeface="+mn-lt"/>
-              </a:rPr>
-              <a:t> : {dict, ‘balanced’}</a:t>
-            </a:r>
-          </a:p>
-          <a:p>
-            <a:r>
-              <a:rPr lang="en-US" b="1">
-                <a:ea typeface="+mn-lt"/>
-                <a:cs typeface="+mn-lt"/>
-              </a:rPr>
-              <a:t>verbose</a:t>
-            </a:r>
-            <a:r>
-              <a:rPr lang="en-US">
-                <a:ea typeface="+mn-lt"/>
-                <a:cs typeface="+mn-lt"/>
-              </a:rPr>
-              <a:t> : bool</a:t>
-            </a:r>
-          </a:p>
-          <a:p>
-            <a:r>
-              <a:rPr lang="en-US" b="1">
-                <a:ea typeface="+mn-lt"/>
-                <a:cs typeface="+mn-lt"/>
-              </a:rPr>
-              <a:t>max_iter</a:t>
-            </a:r>
-            <a:r>
-              <a:rPr lang="en-US">
-                <a:ea typeface="+mn-lt"/>
-                <a:cs typeface="+mn-lt"/>
-              </a:rPr>
-              <a:t> : int</a:t>
-            </a:r>
-          </a:p>
-          <a:p>
-            <a:r>
-              <a:rPr lang="en-US" b="1">
-                <a:ea typeface="+mn-lt"/>
-                <a:cs typeface="+mn-lt"/>
-              </a:rPr>
-              <a:t>decision_function_shape</a:t>
-            </a:r>
-            <a:r>
-              <a:rPr lang="en-US">
-                <a:ea typeface="+mn-lt"/>
-                <a:cs typeface="+mn-lt"/>
-              </a:rPr>
-              <a:t> : ‘ovo’, ‘ovr’</a:t>
-            </a:r>
-            <a:endParaRPr lang="en-US" dirty="0">
-              <a:ea typeface="+mn-lt"/>
-              <a:cs typeface="+mn-lt"/>
-            </a:endParaRPr>
-          </a:p>
-        </p:txBody>
-      </p:sp>
-      <p:sp>
-        <p:nvSpPr>
-          <p:cNvPr id="4" name="Slide Number Placeholder 3">
-            <a:extLst>
-              <a:ext uri="{FF2B5EF4-FFF2-40B4-BE49-F238E27FC236}">
-                <a16:creationId xmlns:a16="http://schemas.microsoft.com/office/drawing/2014/main" id="{3A84B29B-3EDC-4F97-A65A-54B43A8044C5}"/>
-              </a:ext>
-            </a:extLst>
-          </p:cNvPr>
-          <p:cNvSpPr>
-            <a:spLocks noGrp="1"/>
-          </p:cNvSpPr>
-          <p:nvPr>
-            <p:ph type="sldNum" sz="quarter" idx="10"/>
-          </p:nvPr>
-        </p:nvSpPr>
-        <p:spPr/>
-        <p:txBody>
-          <a:bodyPr/>
-          <a:lstStyle/>
-          <a:p>
-            <a:pPr>
-              <a:defRPr/>
-            </a:pPr>
-            <a:fld id="{1BD7A454-CB32-4E38-B84D-A92B3AF364F7}" type="slidenum">
-              <a:rPr lang="en-GB" altLang="en-US"/>
-              <a:pPr>
-                <a:defRPr/>
-              </a:pPr>
-              <a:t>6</a:t>
-            </a:fld>
-            <a:endParaRPr lang="en-GB" altLang="en-US"/>
-          </a:p>
-        </p:txBody>
-      </p:sp>
-      <p:sp>
-        <p:nvSpPr>
-          <p:cNvPr id="6" name="Title 1">
-            <a:extLst>
-              <a:ext uri="{FF2B5EF4-FFF2-40B4-BE49-F238E27FC236}">
-                <a16:creationId xmlns:a16="http://schemas.microsoft.com/office/drawing/2014/main" id="{E7F35D54-A345-4508-BC90-78725F94F748}"/>
-              </a:ext>
-            </a:extLst>
-          </p:cNvPr>
-          <p:cNvSpPr txBox="1">
-            <a:spLocks/>
-          </p:cNvSpPr>
-          <p:nvPr/>
-        </p:nvSpPr>
-        <p:spPr>
-          <a:xfrm>
-            <a:off x="289462" y="1073441"/>
-            <a:ext cx="8640960" cy="507474"/>
-          </a:xfrm>
-          <a:prstGeom prst="rect">
-            <a:avLst/>
-          </a:prstGeom>
-        </p:spPr>
-        <p:txBody>
-          <a:bodyPr>
-            <a:normAutofit fontScale="90000" lnSpcReduction="10000"/>
-          </a:bodyPr>
-          <a:lstStyle>
-            <a:lvl1pPr algn="l" rtl="0" eaLnBrk="0" fontAlgn="base" hangingPunct="0">
-              <a:spcBef>
-                <a:spcPct val="0"/>
-              </a:spcBef>
-              <a:spcAft>
-                <a:spcPct val="0"/>
-              </a:spcAft>
-              <a:defRPr sz="3200" kern="1200">
-                <a:solidFill>
-                  <a:srgbClr val="9A1D2B"/>
-                </a:solidFill>
-                <a:latin typeface="Arial" pitchFamily="34" charset="0"/>
-                <a:ea typeface="+mj-ea"/>
-                <a:cs typeface="Arial" pitchFamily="34" charset="0"/>
-              </a:defRPr>
-            </a:lvl1pPr>
-            <a:lvl2pPr algn="l" rtl="0" eaLnBrk="0" fontAlgn="base" hangingPunct="0">
-              <a:spcBef>
-                <a:spcPct val="0"/>
-              </a:spcBef>
-              <a:spcAft>
-                <a:spcPct val="0"/>
-              </a:spcAft>
-              <a:defRPr sz="3200">
-                <a:solidFill>
-                  <a:srgbClr val="9A1D2B"/>
-                </a:solidFill>
-                <a:latin typeface="Arial" charset="0"/>
-                <a:cs typeface="Arial" charset="0"/>
-              </a:defRPr>
-            </a:lvl2pPr>
-            <a:lvl3pPr algn="l" rtl="0" eaLnBrk="0" fontAlgn="base" hangingPunct="0">
-              <a:spcBef>
-                <a:spcPct val="0"/>
-              </a:spcBef>
-              <a:spcAft>
-                <a:spcPct val="0"/>
-              </a:spcAft>
-              <a:defRPr sz="3200">
-                <a:solidFill>
-                  <a:srgbClr val="9A1D2B"/>
-                </a:solidFill>
-                <a:latin typeface="Arial" charset="0"/>
-                <a:cs typeface="Arial" charset="0"/>
-              </a:defRPr>
-            </a:lvl3pPr>
-            <a:lvl4pPr algn="l" rtl="0" eaLnBrk="0" fontAlgn="base" hangingPunct="0">
-              <a:spcBef>
-                <a:spcPct val="0"/>
-              </a:spcBef>
-              <a:spcAft>
-                <a:spcPct val="0"/>
-              </a:spcAft>
-              <a:defRPr sz="3200">
-                <a:solidFill>
-                  <a:srgbClr val="9A1D2B"/>
-                </a:solidFill>
-                <a:latin typeface="Arial" charset="0"/>
-                <a:cs typeface="Arial" charset="0"/>
-              </a:defRPr>
-            </a:lvl4pPr>
-            <a:lvl5pPr algn="l" rtl="0" eaLnBrk="0" fontAlgn="base" hangingPunct="0">
-              <a:spcBef>
-                <a:spcPct val="0"/>
-              </a:spcBef>
-              <a:spcAft>
-                <a:spcPct val="0"/>
-              </a:spcAft>
-              <a:defRPr sz="3200">
-                <a:solidFill>
-                  <a:srgbClr val="9A1D2B"/>
-                </a:solidFill>
-                <a:latin typeface="Arial" charset="0"/>
-                <a:cs typeface="Arial" charset="0"/>
-              </a:defRPr>
-            </a:lvl5pPr>
-            <a:lvl6pPr marL="457200" algn="l" rtl="0" fontAlgn="base">
-              <a:spcBef>
-                <a:spcPct val="0"/>
-              </a:spcBef>
-              <a:spcAft>
-                <a:spcPct val="0"/>
-              </a:spcAft>
-              <a:defRPr sz="3200">
-                <a:solidFill>
-                  <a:srgbClr val="9A1D2B"/>
-                </a:solidFill>
-                <a:latin typeface="Arial" charset="0"/>
-                <a:cs typeface="Arial" charset="0"/>
-              </a:defRPr>
-            </a:lvl6pPr>
-            <a:lvl7pPr marL="914400" algn="l" rtl="0" fontAlgn="base">
-              <a:spcBef>
-                <a:spcPct val="0"/>
-              </a:spcBef>
-              <a:spcAft>
-                <a:spcPct val="0"/>
-              </a:spcAft>
-              <a:defRPr sz="3200">
-                <a:solidFill>
-                  <a:srgbClr val="9A1D2B"/>
-                </a:solidFill>
-                <a:latin typeface="Arial" charset="0"/>
-                <a:cs typeface="Arial" charset="0"/>
-              </a:defRPr>
-            </a:lvl7pPr>
-            <a:lvl8pPr marL="1371600" algn="l" rtl="0" fontAlgn="base">
-              <a:spcBef>
-                <a:spcPct val="0"/>
-              </a:spcBef>
-              <a:spcAft>
-                <a:spcPct val="0"/>
-              </a:spcAft>
-              <a:defRPr sz="3200">
-                <a:solidFill>
-                  <a:srgbClr val="9A1D2B"/>
-                </a:solidFill>
-                <a:latin typeface="Arial" charset="0"/>
-                <a:cs typeface="Arial" charset="0"/>
-              </a:defRPr>
-            </a:lvl8pPr>
-            <a:lvl9pPr marL="1828800" algn="l" rtl="0" fontAlgn="base">
-              <a:spcBef>
-                <a:spcPct val="0"/>
-              </a:spcBef>
-              <a:spcAft>
-                <a:spcPct val="0"/>
-              </a:spcAft>
-              <a:defRPr sz="3200">
-                <a:solidFill>
-                  <a:srgbClr val="9A1D2B"/>
-                </a:solidFill>
-                <a:latin typeface="Arial" charset="0"/>
-                <a:cs typeface="Arial" charset="0"/>
-              </a:defRPr>
-            </a:lvl9pPr>
-          </a:lstStyle>
-          <a:p>
-            <a:pPr algn="ctr"/>
-            <a:r>
-              <a:rPr lang="en-US">
-                <a:latin typeface="Arial"/>
-                <a:cs typeface="Arial"/>
-              </a:rPr>
-              <a:t>Parameters example</a:t>
-            </a:r>
-            <a:endParaRPr lang="en-US"/>
-          </a:p>
-        </p:txBody>
-      </p:sp>
-    </p:spTree>
-    <p:extLst>
-      <p:ext uri="{BB962C8B-B14F-4D97-AF65-F5344CB8AC3E}">
-        <p14:creationId xmlns:p14="http://schemas.microsoft.com/office/powerpoint/2010/main" val="3367678221"/>
-      </p:ext>
-    </p:extLst>
-  </p:cSld>
-  <p:clrMapOvr>
-    <a:masterClrMapping/>
-  </p:clrMapOvr>
-</p:sld>
-</file>
-
-<file path=ppt/slides/slide7.xml><?xml version="1.0" encoding="utf-8"?>
-<p:sld xmlns:a="http://schemas.openxmlformats.org/drawingml/2006/main" xmlns:r="http://schemas.openxmlformats.org/officeDocument/2006/relationships" xmlns:p="http://schemas.openxmlformats.org/presentationml/2006/main">
-  <p:cSld>
-    <p:spTree>
-      <p:nvGrpSpPr>
-        <p:cNvPr id="1" name=""/>
-        <p:cNvGrpSpPr/>
-        <p:nvPr/>
-      </p:nvGrpSpPr>
-      <p:grpSpPr>
-        <a:xfrm>
-          <a:off x="0" y="0"/>
-          <a:ext cx="0" cy="0"/>
-          <a:chOff x="0" y="0"/>
-          <a:chExt cx="0" cy="0"/>
-        </a:xfrm>
-      </p:grpSpPr>
-      <p:sp>
-        <p:nvSpPr>
-          <p:cNvPr id="2" name="Title 1">
-            <a:extLst>
-              <a:ext uri="{FF2B5EF4-FFF2-40B4-BE49-F238E27FC236}">
-                <a16:creationId xmlns:a16="http://schemas.microsoft.com/office/drawing/2014/main" id="{B5EC141B-C2EB-44E3-91ED-8C54C55946E8}"/>
-              </a:ext>
-            </a:extLst>
-          </p:cNvPr>
-          <p:cNvSpPr>
-            <a:spLocks noGrp="1"/>
-          </p:cNvSpPr>
-          <p:nvPr>
-            <p:ph type="title"/>
-          </p:nvPr>
-        </p:nvSpPr>
-        <p:spPr>
-          <a:xfrm>
-            <a:off x="251520" y="1196752"/>
-            <a:ext cx="8640960" cy="507474"/>
-          </a:xfrm>
-        </p:spPr>
-        <p:txBody>
-          <a:bodyPr>
-            <a:normAutofit fontScale="90000"/>
-          </a:bodyPr>
-          <a:lstStyle/>
-          <a:p>
-            <a:pPr algn="ctr"/>
-            <a:r>
-              <a:rPr lang="en-US">
-                <a:latin typeface="Arial"/>
-                <a:cs typeface="Arial"/>
-              </a:rPr>
-              <a:t>Grid search</a:t>
-            </a:r>
-            <a:endParaRPr lang="en-US" dirty="0"/>
-          </a:p>
-        </p:txBody>
-      </p:sp>
-      <p:sp>
-        <p:nvSpPr>
-          <p:cNvPr id="3" name="Content Placeholder 2">
-            <a:extLst>
-              <a:ext uri="{FF2B5EF4-FFF2-40B4-BE49-F238E27FC236}">
-                <a16:creationId xmlns:a16="http://schemas.microsoft.com/office/drawing/2014/main" id="{A63D06AA-6810-47CA-A223-02833B308F4B}"/>
-              </a:ext>
-            </a:extLst>
-          </p:cNvPr>
-          <p:cNvSpPr>
-            <a:spLocks noGrp="1"/>
-          </p:cNvSpPr>
-          <p:nvPr>
-            <p:ph idx="1"/>
-          </p:nvPr>
-        </p:nvSpPr>
-        <p:spPr>
-          <a:xfrm>
-            <a:off x="251520" y="1747421"/>
-            <a:ext cx="8640960" cy="4378743"/>
-          </a:xfrm>
-        </p:spPr>
-        <p:txBody>
-          <a:bodyPr/>
-          <a:lstStyle/>
-          <a:p>
-            <a:r>
-              <a:rPr lang="en-US">
-                <a:solidFill>
-                  <a:srgbClr val="000000"/>
-                </a:solidFill>
-                <a:cs typeface="Calibri"/>
-              </a:rPr>
-              <a:t>An extensive multi-parameter search approach used in machine learning to determine an optimal combination of given parameter values.</a:t>
-            </a:r>
-          </a:p>
-          <a:p>
-            <a:endParaRPr lang="en-US" dirty="0">
-              <a:solidFill>
-                <a:srgbClr val="000000"/>
-              </a:solidFill>
-              <a:cs typeface="Calibri"/>
-            </a:endParaRPr>
-          </a:p>
-          <a:p>
-            <a:r>
-              <a:rPr lang="en-US">
-                <a:solidFill>
-                  <a:srgbClr val="000000"/>
-                </a:solidFill>
-                <a:cs typeface="Calibri"/>
-              </a:rPr>
-              <a:t>The search develops models with the different parameters combined and evaluate against each other</a:t>
-            </a:r>
-            <a:endParaRPr lang="en-US" dirty="0">
-              <a:solidFill>
-                <a:srgbClr val="000000"/>
-              </a:solidFill>
-              <a:cs typeface="Calibri"/>
-            </a:endParaRPr>
-          </a:p>
-        </p:txBody>
-      </p:sp>
-      <p:sp>
-        <p:nvSpPr>
-          <p:cNvPr id="4" name="Slide Number Placeholder 3">
-            <a:extLst>
-              <a:ext uri="{FF2B5EF4-FFF2-40B4-BE49-F238E27FC236}">
-                <a16:creationId xmlns:a16="http://schemas.microsoft.com/office/drawing/2014/main" id="{4DF14D75-0536-4471-8E0C-A6F8029DE145}"/>
-              </a:ext>
-            </a:extLst>
-          </p:cNvPr>
-          <p:cNvSpPr>
-            <a:spLocks noGrp="1"/>
-          </p:cNvSpPr>
-          <p:nvPr>
-            <p:ph type="sldNum" sz="quarter" idx="10"/>
-          </p:nvPr>
-        </p:nvSpPr>
-        <p:spPr/>
-        <p:txBody>
-          <a:bodyPr/>
-          <a:lstStyle/>
-          <a:p>
-            <a:pPr>
-              <a:defRPr/>
-            </a:pPr>
-            <a:fld id="{953A5B41-6D74-47B9-8560-F73E964C6B20}" type="slidenum">
-              <a:rPr lang="en-GB" altLang="en-US"/>
-              <a:pPr>
-                <a:defRPr/>
-              </a:pPr>
-              <a:t>7</a:t>
-            </a:fld>
-            <a:endParaRPr lang="en-GB" altLang="en-US"/>
-          </a:p>
-        </p:txBody>
-      </p:sp>
-    </p:spTree>
-    <p:extLst>
-      <p:ext uri="{BB962C8B-B14F-4D97-AF65-F5344CB8AC3E}">
-        <p14:creationId xmlns:p14="http://schemas.microsoft.com/office/powerpoint/2010/main" val="1314439175"/>
-      </p:ext>
-    </p:extLst>
-  </p:cSld>
-  <p:clrMapOvr>
-    <a:masterClrMapping/>
-  </p:clrMapOvr>
-</p:sld>
-</file>
-
-<file path=ppt/slides/slide8.xml><?xml version="1.0" encoding="utf-8"?>
-<p:sld xmlns:a="http://schemas.openxmlformats.org/drawingml/2006/main" xmlns:r="http://schemas.openxmlformats.org/officeDocument/2006/relationships" xmlns:p="http://schemas.openxmlformats.org/presentationml/2006/main">
-  <p:cSld>
-    <p:spTree>
-      <p:nvGrpSpPr>
-        <p:cNvPr id="1" name=""/>
-        <p:cNvGrpSpPr/>
-        <p:nvPr/>
-      </p:nvGrpSpPr>
-      <p:grpSpPr>
-        <a:xfrm>
-          <a:off x="0" y="0"/>
-          <a:ext cx="0" cy="0"/>
-          <a:chOff x="0" y="0"/>
-          <a:chExt cx="0" cy="0"/>
-        </a:xfrm>
-      </p:grpSpPr>
-      <p:sp>
-        <p:nvSpPr>
-          <p:cNvPr id="2" name="Title 1">
-            <a:extLst>
-              <a:ext uri="{FF2B5EF4-FFF2-40B4-BE49-F238E27FC236}">
-                <a16:creationId xmlns:a16="http://schemas.microsoft.com/office/drawing/2014/main" id="{E6C22751-A4D8-4504-98ED-E39B9AF019CB}"/>
-              </a:ext>
-            </a:extLst>
-          </p:cNvPr>
-          <p:cNvSpPr>
-            <a:spLocks noGrp="1"/>
-          </p:cNvSpPr>
-          <p:nvPr>
-            <p:ph type="title"/>
-          </p:nvPr>
-        </p:nvSpPr>
-        <p:spPr>
-          <a:xfrm>
-            <a:off x="251520" y="1196752"/>
-            <a:ext cx="8640960" cy="545415"/>
-          </a:xfrm>
-        </p:spPr>
-        <p:txBody>
-          <a:bodyPr>
-            <a:normAutofit fontScale="90000"/>
-          </a:bodyPr>
-          <a:lstStyle/>
-          <a:p>
-            <a:pPr algn="ctr"/>
-            <a:r>
-              <a:rPr lang="en-US">
-                <a:latin typeface="Arial"/>
-                <a:cs typeface="Arial"/>
-              </a:rPr>
-              <a:t>Grid search and cross validation</a:t>
-            </a:r>
-            <a:endParaRPr lang="en-US"/>
-          </a:p>
-        </p:txBody>
-      </p:sp>
-      <p:sp>
-        <p:nvSpPr>
-          <p:cNvPr id="3" name="Content Placeholder 2">
-            <a:extLst>
-              <a:ext uri="{FF2B5EF4-FFF2-40B4-BE49-F238E27FC236}">
-                <a16:creationId xmlns:a16="http://schemas.microsoft.com/office/drawing/2014/main" id="{4B45B5C9-8A4B-4B0F-8B89-2335ED25FCE7}"/>
-              </a:ext>
-            </a:extLst>
-          </p:cNvPr>
-          <p:cNvSpPr>
-            <a:spLocks noGrp="1"/>
-          </p:cNvSpPr>
-          <p:nvPr>
-            <p:ph idx="1"/>
-          </p:nvPr>
-        </p:nvSpPr>
-        <p:spPr>
-          <a:xfrm>
-            <a:off x="251520" y="1804333"/>
-            <a:ext cx="8640960" cy="4321831"/>
-          </a:xfrm>
-        </p:spPr>
-        <p:txBody>
-          <a:bodyPr/>
-          <a:lstStyle/>
-          <a:p>
-            <a:r>
-              <a:rPr lang="en-US">
-                <a:cs typeface="Calibri"/>
-              </a:rPr>
-              <a:t>The grid seach process is usually combined with cross validation</a:t>
-            </a:r>
-            <a:endParaRPr lang="en-US"/>
-          </a:p>
-        </p:txBody>
-      </p:sp>
-      <p:sp>
-        <p:nvSpPr>
-          <p:cNvPr id="4" name="Slide Number Placeholder 3">
-            <a:extLst>
-              <a:ext uri="{FF2B5EF4-FFF2-40B4-BE49-F238E27FC236}">
-                <a16:creationId xmlns:a16="http://schemas.microsoft.com/office/drawing/2014/main" id="{B68BC167-BD63-466E-B433-FCA680A5FC5A}"/>
-              </a:ext>
-            </a:extLst>
-          </p:cNvPr>
-          <p:cNvSpPr>
-            <a:spLocks noGrp="1"/>
-          </p:cNvSpPr>
-          <p:nvPr>
-            <p:ph type="sldNum" sz="quarter" idx="10"/>
-          </p:nvPr>
-        </p:nvSpPr>
-        <p:spPr/>
-        <p:txBody>
-          <a:bodyPr/>
-          <a:lstStyle/>
-          <a:p>
-            <a:pPr>
-              <a:defRPr/>
-            </a:pPr>
-            <a:fld id="{953A5B41-6D74-47B9-8560-F73E964C6B20}" type="slidenum">
-              <a:rPr lang="en-GB" altLang="en-US"/>
-              <a:pPr>
-                <a:defRPr/>
-              </a:pPr>
-              <a:t>8</a:t>
-            </a:fld>
-            <a:endParaRPr lang="en-GB" altLang="en-US"/>
-          </a:p>
-        </p:txBody>
-      </p:sp>
-    </p:spTree>
-    <p:extLst>
-      <p:ext uri="{BB962C8B-B14F-4D97-AF65-F5344CB8AC3E}">
-        <p14:creationId xmlns:p14="http://schemas.microsoft.com/office/powerpoint/2010/main" val="3739775826"/>
-      </p:ext>
-    </p:extLst>
-  </p:cSld>
-  <p:clrMapOvr>
-    <a:masterClrMapping/>
-  </p:clrMapOvr>
-</p:sld>
-</file>
-
-<file path=ppt/slides/slide9.xml><?xml version="1.0" encoding="utf-8"?>
+<file path=ppt/slides/slide10.xml><?xml version="1.0" encoding="utf-8"?>
 <p:sld xmlns:a="http://schemas.openxmlformats.org/drawingml/2006/main" xmlns:r="http://schemas.openxmlformats.org/officeDocument/2006/relationships" xmlns:p="http://schemas.openxmlformats.org/presentationml/2006/main">
   <p:cSld>
     <p:spTree>
@@ -5313,6 +3553,2036 @@
     <p:extLst>
       <p:ext uri="{BB962C8B-B14F-4D97-AF65-F5344CB8AC3E}">
         <p14:creationId xmlns:p14="http://schemas.microsoft.com/office/powerpoint/2010/main" val="2626687310"/>
+      </p:ext>
+    </p:extLst>
+  </p:cSld>
+  <p:clrMapOvr>
+    <a:masterClrMapping/>
+  </p:clrMapOvr>
+</p:sld>
+</file>
+
+<file path=ppt/slides/slide2.xml><?xml version="1.0" encoding="utf-8"?>
+<p:sld xmlns:a="http://schemas.openxmlformats.org/drawingml/2006/main" xmlns:r="http://schemas.openxmlformats.org/officeDocument/2006/relationships" xmlns:p="http://schemas.openxmlformats.org/presentationml/2006/main">
+  <p:cSld>
+    <p:spTree>
+      <p:nvGrpSpPr>
+        <p:cNvPr id="1" name=""/>
+        <p:cNvGrpSpPr/>
+        <p:nvPr/>
+      </p:nvGrpSpPr>
+      <p:grpSpPr>
+        <a:xfrm>
+          <a:off x="0" y="0"/>
+          <a:ext cx="0" cy="0"/>
+          <a:chOff x="0" y="0"/>
+          <a:chExt cx="0" cy="0"/>
+        </a:xfrm>
+      </p:grpSpPr>
+      <p:sp>
+        <p:nvSpPr>
+          <p:cNvPr id="2" name="Title 1">
+            <a:extLst>
+              <a:ext uri="{FF2B5EF4-FFF2-40B4-BE49-F238E27FC236}">
+                <a16:creationId xmlns:a16="http://schemas.microsoft.com/office/drawing/2014/main" id="{99696315-2ADD-47A6-93B0-FC710997F27C}"/>
+              </a:ext>
+            </a:extLst>
+          </p:cNvPr>
+          <p:cNvSpPr>
+            <a:spLocks noGrp="1"/>
+          </p:cNvSpPr>
+          <p:nvPr>
+            <p:ph type="title"/>
+          </p:nvPr>
+        </p:nvSpPr>
+        <p:spPr>
+          <a:xfrm>
+            <a:off x="365346" y="1595141"/>
+            <a:ext cx="8640960" cy="497989"/>
+          </a:xfrm>
+        </p:spPr>
+        <p:txBody>
+          <a:bodyPr>
+            <a:normAutofit fontScale="90000"/>
+          </a:bodyPr>
+          <a:lstStyle/>
+          <a:p>
+            <a:pPr algn="ctr"/>
+            <a:r>
+              <a:rPr lang="en-US"/>
+              <a:t>Recap of last session</a:t>
+            </a:r>
+          </a:p>
+          <a:p>
+            <a:endParaRPr lang="en-US" dirty="0"/>
+          </a:p>
+        </p:txBody>
+      </p:sp>
+      <p:sp>
+        <p:nvSpPr>
+          <p:cNvPr id="3" name="Content Placeholder 2">
+            <a:extLst>
+              <a:ext uri="{FF2B5EF4-FFF2-40B4-BE49-F238E27FC236}">
+                <a16:creationId xmlns:a16="http://schemas.microsoft.com/office/drawing/2014/main" id="{CA56E53C-4F8C-4282-82E1-AB3E8EBF09F4}"/>
+              </a:ext>
+            </a:extLst>
+          </p:cNvPr>
+          <p:cNvSpPr>
+            <a:spLocks noGrp="1"/>
+          </p:cNvSpPr>
+          <p:nvPr>
+            <p:ph idx="1"/>
+          </p:nvPr>
+        </p:nvSpPr>
+        <p:spPr>
+          <a:xfrm>
+            <a:off x="251520" y="1652566"/>
+            <a:ext cx="8640960" cy="4473598"/>
+          </a:xfrm>
+        </p:spPr>
+        <p:txBody>
+          <a:bodyPr/>
+          <a:lstStyle/>
+          <a:p>
+            <a:r>
+              <a:rPr lang="en-US">
+                <a:cs typeface="Calibri"/>
+              </a:rPr>
+              <a:t>Cross validation</a:t>
+            </a:r>
+          </a:p>
+          <a:p>
+            <a:pPr lvl="1"/>
+            <a:r>
+              <a:rPr lang="en-US">
+                <a:solidFill>
+                  <a:srgbClr val="000000"/>
+                </a:solidFill>
+                <a:cs typeface="Calibri"/>
+              </a:rPr>
+              <a:t>Meaning and types of cross validation</a:t>
+            </a:r>
+          </a:p>
+          <a:p>
+            <a:pPr lvl="1"/>
+            <a:r>
+              <a:rPr lang="en-US">
+                <a:solidFill>
+                  <a:srgbClr val="000000"/>
+                </a:solidFill>
+                <a:cs typeface="Calibri"/>
+              </a:rPr>
+              <a:t>Importance of cross validation </a:t>
+            </a:r>
+          </a:p>
+          <a:p>
+            <a:pPr lvl="1"/>
+            <a:r>
+              <a:rPr lang="en-US">
+                <a:solidFill>
+                  <a:srgbClr val="000000"/>
+                </a:solidFill>
+                <a:cs typeface="Calibri"/>
+              </a:rPr>
+              <a:t>Implementation </a:t>
+            </a:r>
+            <a:endParaRPr lang="en-US" dirty="0">
+              <a:solidFill>
+                <a:srgbClr val="000000"/>
+              </a:solidFill>
+              <a:cs typeface="Calibri"/>
+            </a:endParaRPr>
+          </a:p>
+        </p:txBody>
+      </p:sp>
+      <p:sp>
+        <p:nvSpPr>
+          <p:cNvPr id="4" name="Slide Number Placeholder 3">
+            <a:extLst>
+              <a:ext uri="{FF2B5EF4-FFF2-40B4-BE49-F238E27FC236}">
+                <a16:creationId xmlns:a16="http://schemas.microsoft.com/office/drawing/2014/main" id="{797A7A71-9C53-4E04-9A0A-B8BD62ACC52B}"/>
+              </a:ext>
+            </a:extLst>
+          </p:cNvPr>
+          <p:cNvSpPr>
+            <a:spLocks noGrp="1"/>
+          </p:cNvSpPr>
+          <p:nvPr>
+            <p:ph type="sldNum" sz="quarter" idx="10"/>
+          </p:nvPr>
+        </p:nvSpPr>
+        <p:spPr/>
+        <p:txBody>
+          <a:bodyPr/>
+          <a:lstStyle/>
+          <a:p>
+            <a:pPr>
+              <a:defRPr/>
+            </a:pPr>
+            <a:fld id="{953A5B41-6D74-47B9-8560-F73E964C6B20}" type="slidenum">
+              <a:rPr lang="en-GB" altLang="en-US"/>
+              <a:pPr>
+                <a:defRPr/>
+              </a:pPr>
+              <a:t>2</a:t>
+            </a:fld>
+            <a:endParaRPr lang="en-GB" altLang="en-US"/>
+          </a:p>
+        </p:txBody>
+      </p:sp>
+    </p:spTree>
+    <p:extLst>
+      <p:ext uri="{BB962C8B-B14F-4D97-AF65-F5344CB8AC3E}">
+        <p14:creationId xmlns:p14="http://schemas.microsoft.com/office/powerpoint/2010/main" val="2937506155"/>
+      </p:ext>
+    </p:extLst>
+  </p:cSld>
+  <p:clrMapOvr>
+    <a:masterClrMapping/>
+  </p:clrMapOvr>
+</p:sld>
+</file>
+
+<file path=ppt/slides/slide3.xml><?xml version="1.0" encoding="utf-8"?>
+<p:sld xmlns:a="http://schemas.openxmlformats.org/drawingml/2006/main" xmlns:r="http://schemas.openxmlformats.org/officeDocument/2006/relationships" xmlns:p="http://schemas.openxmlformats.org/presentationml/2006/main">
+  <p:cSld>
+    <p:spTree>
+      <p:nvGrpSpPr>
+        <p:cNvPr id="1" name=""/>
+        <p:cNvGrpSpPr/>
+        <p:nvPr/>
+      </p:nvGrpSpPr>
+      <p:grpSpPr>
+        <a:xfrm>
+          <a:off x="0" y="0"/>
+          <a:ext cx="0" cy="0"/>
+          <a:chOff x="0" y="0"/>
+          <a:chExt cx="0" cy="0"/>
+        </a:xfrm>
+      </p:grpSpPr>
+      <p:sp>
+        <p:nvSpPr>
+          <p:cNvPr id="2" name="Title 1">
+            <a:extLst>
+              <a:ext uri="{FF2B5EF4-FFF2-40B4-BE49-F238E27FC236}">
+                <a16:creationId xmlns:a16="http://schemas.microsoft.com/office/drawing/2014/main" id="{E43E139F-EE3B-45ED-AB9B-C10D0F23C60F}"/>
+              </a:ext>
+            </a:extLst>
+          </p:cNvPr>
+          <p:cNvSpPr>
+            <a:spLocks noGrp="1"/>
+          </p:cNvSpPr>
+          <p:nvPr>
+            <p:ph type="title"/>
+          </p:nvPr>
+        </p:nvSpPr>
+        <p:spPr>
+          <a:xfrm>
+            <a:off x="251520" y="1007042"/>
+            <a:ext cx="8640960" cy="526444"/>
+          </a:xfrm>
+        </p:spPr>
+        <p:txBody>
+          <a:bodyPr>
+            <a:normAutofit fontScale="90000"/>
+          </a:bodyPr>
+          <a:lstStyle/>
+          <a:p>
+            <a:pPr algn="ctr"/>
+            <a:r>
+              <a:rPr lang="en-US" dirty="0">
+                <a:latin typeface="Arial"/>
+                <a:cs typeface="Arial"/>
+              </a:rPr>
+              <a:t>Concepts learnt so far</a:t>
+            </a:r>
+            <a:endParaRPr lang="en-US" dirty="0"/>
+          </a:p>
+        </p:txBody>
+      </p:sp>
+      <p:sp>
+        <p:nvSpPr>
+          <p:cNvPr id="3" name="Content Placeholder 2">
+            <a:extLst>
+              <a:ext uri="{FF2B5EF4-FFF2-40B4-BE49-F238E27FC236}">
+                <a16:creationId xmlns:a16="http://schemas.microsoft.com/office/drawing/2014/main" id="{27A90F49-1915-44AB-8AF6-EBE3E4765CAF}"/>
+              </a:ext>
+            </a:extLst>
+          </p:cNvPr>
+          <p:cNvSpPr>
+            <a:spLocks noGrp="1"/>
+          </p:cNvSpPr>
+          <p:nvPr>
+            <p:ph idx="1"/>
+          </p:nvPr>
+        </p:nvSpPr>
+        <p:spPr>
+          <a:xfrm>
+            <a:off x="251520" y="1481828"/>
+            <a:ext cx="8640960" cy="4397714"/>
+          </a:xfrm>
+        </p:spPr>
+        <p:txBody>
+          <a:bodyPr/>
+          <a:lstStyle/>
+          <a:p>
+            <a:r>
+              <a:rPr lang="en-US" sz="2400" dirty="0">
+                <a:cs typeface="Calibri"/>
+              </a:rPr>
+              <a:t>Brief intro to machine learning </a:t>
+            </a:r>
+          </a:p>
+          <a:p>
+            <a:r>
+              <a:rPr lang="en-US" sz="2400" dirty="0">
+                <a:cs typeface="Calibri"/>
+              </a:rPr>
+              <a:t>Text mining basics</a:t>
+            </a:r>
+          </a:p>
+          <a:p>
+            <a:r>
+              <a:rPr lang="en-US" sz="2400" dirty="0">
+                <a:cs typeface="Calibri"/>
+              </a:rPr>
+              <a:t>Text classification steps:</a:t>
+            </a:r>
+          </a:p>
+          <a:p>
+            <a:pPr lvl="1"/>
+            <a:r>
+              <a:rPr lang="en-US" sz="2000" dirty="0">
+                <a:solidFill>
+                  <a:srgbClr val="000000"/>
+                </a:solidFill>
+                <a:cs typeface="Calibri"/>
+              </a:rPr>
+              <a:t>Data retrieval</a:t>
+            </a:r>
+            <a:endParaRPr lang="en-US" sz="2000">
+              <a:cs typeface="Calibri"/>
+            </a:endParaRPr>
+          </a:p>
+          <a:p>
+            <a:pPr lvl="1"/>
+            <a:r>
+              <a:rPr lang="en-US" sz="2000" dirty="0">
+                <a:solidFill>
+                  <a:srgbClr val="000000"/>
+                </a:solidFill>
+                <a:cs typeface="Calibri"/>
+              </a:rPr>
+              <a:t>Data exploration</a:t>
+            </a:r>
+          </a:p>
+          <a:p>
+            <a:pPr lvl="1"/>
+            <a:r>
+              <a:rPr lang="en-US" sz="2000" dirty="0">
+                <a:solidFill>
+                  <a:srgbClr val="000000"/>
+                </a:solidFill>
+                <a:cs typeface="Calibri"/>
+              </a:rPr>
+              <a:t>Text preprocessing – cleaning</a:t>
+            </a:r>
+          </a:p>
+          <a:p>
+            <a:pPr lvl="1"/>
+            <a:r>
+              <a:rPr lang="en-US" sz="2000" dirty="0">
+                <a:solidFill>
+                  <a:srgbClr val="000000"/>
+                </a:solidFill>
+                <a:cs typeface="Calibri"/>
+              </a:rPr>
+              <a:t>Text representation</a:t>
+            </a:r>
+          </a:p>
+          <a:p>
+            <a:pPr lvl="1"/>
+            <a:r>
+              <a:rPr lang="en-US" sz="2000" dirty="0">
+                <a:solidFill>
+                  <a:srgbClr val="000000"/>
+                </a:solidFill>
+                <a:cs typeface="Calibri"/>
+              </a:rPr>
+              <a:t>Dimensionality reduction</a:t>
+            </a:r>
+          </a:p>
+          <a:p>
+            <a:pPr lvl="1"/>
+            <a:r>
+              <a:rPr lang="en-US" sz="2000" dirty="0">
+                <a:solidFill>
+                  <a:srgbClr val="000000"/>
+                </a:solidFill>
+                <a:cs typeface="Calibri"/>
+              </a:rPr>
+              <a:t>Text classification – models</a:t>
+            </a:r>
+          </a:p>
+          <a:p>
+            <a:pPr lvl="1"/>
+            <a:r>
+              <a:rPr lang="en-US" sz="2000" dirty="0">
+                <a:solidFill>
+                  <a:srgbClr val="000000"/>
+                </a:solidFill>
+                <a:cs typeface="Calibri"/>
+              </a:rPr>
+              <a:t>Model assessment</a:t>
+            </a:r>
+          </a:p>
+          <a:p>
+            <a:pPr lvl="1"/>
+            <a:r>
+              <a:rPr lang="en-US" sz="2000" dirty="0">
+                <a:solidFill>
+                  <a:srgbClr val="000000"/>
+                </a:solidFill>
+                <a:cs typeface="Calibri"/>
+              </a:rPr>
+              <a:t>Cross validation</a:t>
+            </a:r>
+            <a:endParaRPr lang="en-US" sz="2000">
+              <a:cs typeface="Calibri"/>
+            </a:endParaRPr>
+          </a:p>
+          <a:p>
+            <a:endParaRPr lang="en-US" sz="2000" dirty="0">
+              <a:cs typeface="Calibri"/>
+            </a:endParaRPr>
+          </a:p>
+        </p:txBody>
+      </p:sp>
+      <p:sp>
+        <p:nvSpPr>
+          <p:cNvPr id="4" name="Slide Number Placeholder 3">
+            <a:extLst>
+              <a:ext uri="{FF2B5EF4-FFF2-40B4-BE49-F238E27FC236}">
+                <a16:creationId xmlns:a16="http://schemas.microsoft.com/office/drawing/2014/main" id="{61DFDBC3-87BA-4BB1-AC77-3CF547914E96}"/>
+              </a:ext>
+            </a:extLst>
+          </p:cNvPr>
+          <p:cNvSpPr>
+            <a:spLocks noGrp="1"/>
+          </p:cNvSpPr>
+          <p:nvPr>
+            <p:ph type="sldNum" sz="quarter" idx="10"/>
+          </p:nvPr>
+        </p:nvSpPr>
+        <p:spPr/>
+        <p:txBody>
+          <a:bodyPr/>
+          <a:lstStyle/>
+          <a:p>
+            <a:pPr>
+              <a:defRPr/>
+            </a:pPr>
+            <a:fld id="{953A5B41-6D74-47B9-8560-F73E964C6B20}" type="slidenum">
+              <a:rPr lang="en-GB" altLang="en-US"/>
+              <a:pPr>
+                <a:defRPr/>
+              </a:pPr>
+              <a:t>‹#›</a:t>
+            </a:fld>
+            <a:endParaRPr lang="en-GB" altLang="en-US"/>
+          </a:p>
+        </p:txBody>
+      </p:sp>
+    </p:spTree>
+    <p:extLst>
+      <p:ext uri="{BB962C8B-B14F-4D97-AF65-F5344CB8AC3E}">
+        <p14:creationId xmlns:p14="http://schemas.microsoft.com/office/powerpoint/2010/main" val="3129145444"/>
+      </p:ext>
+    </p:extLst>
+  </p:cSld>
+  <p:clrMapOvr>
+    <a:masterClrMapping/>
+  </p:clrMapOvr>
+</p:sld>
+</file>
+
+<file path=ppt/slides/slide4.xml><?xml version="1.0" encoding="utf-8"?>
+<p:sld xmlns:a="http://schemas.openxmlformats.org/drawingml/2006/main" xmlns:r="http://schemas.openxmlformats.org/officeDocument/2006/relationships" xmlns:p="http://schemas.openxmlformats.org/presentationml/2006/main">
+  <p:cSld>
+    <p:spTree>
+      <p:nvGrpSpPr>
+        <p:cNvPr id="1" name=""/>
+        <p:cNvGrpSpPr/>
+        <p:nvPr/>
+      </p:nvGrpSpPr>
+      <p:grpSpPr>
+        <a:xfrm>
+          <a:off x="0" y="0"/>
+          <a:ext cx="0" cy="0"/>
+          <a:chOff x="0" y="0"/>
+          <a:chExt cx="0" cy="0"/>
+        </a:xfrm>
+      </p:grpSpPr>
+      <p:sp>
+        <p:nvSpPr>
+          <p:cNvPr id="2" name="Title 1">
+            <a:extLst>
+              <a:ext uri="{FF2B5EF4-FFF2-40B4-BE49-F238E27FC236}">
+                <a16:creationId xmlns:a16="http://schemas.microsoft.com/office/drawing/2014/main" id="{92A796FA-4BE7-4954-B3A8-D27334CE307D}"/>
+              </a:ext>
+            </a:extLst>
+          </p:cNvPr>
+          <p:cNvSpPr>
+            <a:spLocks noGrp="1"/>
+          </p:cNvSpPr>
+          <p:nvPr>
+            <p:ph type="title"/>
+          </p:nvPr>
+        </p:nvSpPr>
+        <p:spPr>
+          <a:xfrm>
+            <a:off x="298947" y="1149324"/>
+            <a:ext cx="8640960" cy="497988"/>
+          </a:xfrm>
+        </p:spPr>
+        <p:txBody>
+          <a:bodyPr>
+            <a:normAutofit fontScale="90000"/>
+          </a:bodyPr>
+          <a:lstStyle/>
+          <a:p>
+            <a:pPr algn="ctr"/>
+            <a:r>
+              <a:rPr lang="en-US">
+                <a:latin typeface="Arial"/>
+                <a:cs typeface="Arial"/>
+              </a:rPr>
+              <a:t>This session</a:t>
+            </a:r>
+            <a:endParaRPr lang="en-US"/>
+          </a:p>
+        </p:txBody>
+      </p:sp>
+      <p:sp>
+        <p:nvSpPr>
+          <p:cNvPr id="3" name="Content Placeholder 2">
+            <a:extLst>
+              <a:ext uri="{FF2B5EF4-FFF2-40B4-BE49-F238E27FC236}">
+                <a16:creationId xmlns:a16="http://schemas.microsoft.com/office/drawing/2014/main" id="{3139FAD8-3586-4FC6-BE08-EFD8AE136EEE}"/>
+              </a:ext>
+            </a:extLst>
+          </p:cNvPr>
+          <p:cNvSpPr>
+            <a:spLocks noGrp="1"/>
+          </p:cNvSpPr>
+          <p:nvPr>
+            <p:ph idx="1"/>
+          </p:nvPr>
+        </p:nvSpPr>
+        <p:spPr>
+          <a:xfrm>
+            <a:off x="251520" y="1595653"/>
+            <a:ext cx="8640960" cy="4530511"/>
+          </a:xfrm>
+        </p:spPr>
+        <p:txBody>
+          <a:bodyPr/>
+          <a:lstStyle/>
+          <a:p>
+            <a:r>
+              <a:rPr lang="en-US" dirty="0">
+                <a:cs typeface="Calibri"/>
+              </a:rPr>
+              <a:t>Parameter tuning</a:t>
+            </a:r>
+          </a:p>
+          <a:p>
+            <a:pPr lvl="1"/>
+            <a:r>
+              <a:rPr lang="en-US" dirty="0">
+                <a:solidFill>
+                  <a:srgbClr val="000000"/>
+                </a:solidFill>
+                <a:cs typeface="Calibri"/>
+              </a:rPr>
+              <a:t>Grid searching</a:t>
+            </a:r>
+          </a:p>
+          <a:p>
+            <a:pPr lvl="1"/>
+            <a:r>
+              <a:rPr lang="en-US" dirty="0">
+                <a:solidFill>
+                  <a:srgbClr val="000000"/>
+                </a:solidFill>
+                <a:cs typeface="Calibri"/>
+              </a:rPr>
+              <a:t>Cross validation</a:t>
+            </a:r>
+          </a:p>
+          <a:p>
+            <a:pPr lvl="1"/>
+            <a:r>
+              <a:rPr lang="en-US" dirty="0">
+                <a:solidFill>
+                  <a:srgbClr val="000000"/>
+                </a:solidFill>
+                <a:cs typeface="Calibri"/>
+              </a:rPr>
+              <a:t>Pipelining </a:t>
+            </a:r>
+          </a:p>
+        </p:txBody>
+      </p:sp>
+      <p:sp>
+        <p:nvSpPr>
+          <p:cNvPr id="4" name="Slide Number Placeholder 3">
+            <a:extLst>
+              <a:ext uri="{FF2B5EF4-FFF2-40B4-BE49-F238E27FC236}">
+                <a16:creationId xmlns:a16="http://schemas.microsoft.com/office/drawing/2014/main" id="{334EA053-1C8C-42CF-B907-DE93FEEC1DF9}"/>
+              </a:ext>
+            </a:extLst>
+          </p:cNvPr>
+          <p:cNvSpPr>
+            <a:spLocks noGrp="1"/>
+          </p:cNvSpPr>
+          <p:nvPr>
+            <p:ph type="sldNum" sz="quarter" idx="10"/>
+          </p:nvPr>
+        </p:nvSpPr>
+        <p:spPr/>
+        <p:txBody>
+          <a:bodyPr/>
+          <a:lstStyle/>
+          <a:p>
+            <a:pPr>
+              <a:defRPr/>
+            </a:pPr>
+            <a:fld id="{953A5B41-6D74-47B9-8560-F73E964C6B20}" type="slidenum">
+              <a:rPr lang="en-GB" altLang="en-US"/>
+              <a:pPr>
+                <a:defRPr/>
+              </a:pPr>
+              <a:t>3</a:t>
+            </a:fld>
+            <a:endParaRPr lang="en-GB" altLang="en-US"/>
+          </a:p>
+        </p:txBody>
+      </p:sp>
+    </p:spTree>
+    <p:extLst>
+      <p:ext uri="{BB962C8B-B14F-4D97-AF65-F5344CB8AC3E}">
+        <p14:creationId xmlns:p14="http://schemas.microsoft.com/office/powerpoint/2010/main" val="2968239713"/>
+      </p:ext>
+    </p:extLst>
+  </p:cSld>
+  <p:clrMapOvr>
+    <a:masterClrMapping/>
+  </p:clrMapOvr>
+</p:sld>
+</file>
+
+<file path=ppt/slides/slide5.xml><?xml version="1.0" encoding="utf-8"?>
+<p:sld xmlns:a="http://schemas.openxmlformats.org/drawingml/2006/main" xmlns:r="http://schemas.openxmlformats.org/officeDocument/2006/relationships" xmlns:p="http://schemas.openxmlformats.org/presentationml/2006/main">
+  <p:cSld>
+    <p:spTree>
+      <p:nvGrpSpPr>
+        <p:cNvPr id="1" name=""/>
+        <p:cNvGrpSpPr/>
+        <p:nvPr/>
+      </p:nvGrpSpPr>
+      <p:grpSpPr>
+        <a:xfrm>
+          <a:off x="0" y="0"/>
+          <a:ext cx="0" cy="0"/>
+          <a:chOff x="0" y="0"/>
+          <a:chExt cx="0" cy="0"/>
+        </a:xfrm>
+      </p:grpSpPr>
+      <p:sp>
+        <p:nvSpPr>
+          <p:cNvPr id="2" name="Title 1">
+            <a:extLst>
+              <a:ext uri="{FF2B5EF4-FFF2-40B4-BE49-F238E27FC236}">
+                <a16:creationId xmlns:a16="http://schemas.microsoft.com/office/drawing/2014/main" id="{A27934E1-92EF-467F-AAF8-17C8CF8D73DE}"/>
+              </a:ext>
+            </a:extLst>
+          </p:cNvPr>
+          <p:cNvSpPr>
+            <a:spLocks noGrp="1"/>
+          </p:cNvSpPr>
+          <p:nvPr>
+            <p:ph type="title"/>
+          </p:nvPr>
+        </p:nvSpPr>
+        <p:spPr>
+          <a:xfrm>
+            <a:off x="251520" y="1196752"/>
+            <a:ext cx="8640960" cy="479017"/>
+          </a:xfrm>
+        </p:spPr>
+        <p:txBody>
+          <a:bodyPr>
+            <a:normAutofit fontScale="90000"/>
+          </a:bodyPr>
+          <a:lstStyle/>
+          <a:p>
+            <a:pPr algn="ctr"/>
+            <a:r>
+              <a:rPr lang="en-US" dirty="0">
+                <a:latin typeface="Arial"/>
+                <a:cs typeface="Arial"/>
+              </a:rPr>
+              <a:t>Parameter tuning (justification)</a:t>
+            </a:r>
+            <a:endParaRPr lang="en-US" dirty="0"/>
+          </a:p>
+        </p:txBody>
+      </p:sp>
+      <p:sp>
+        <p:nvSpPr>
+          <p:cNvPr id="3" name="Content Placeholder 2">
+            <a:extLst>
+              <a:ext uri="{FF2B5EF4-FFF2-40B4-BE49-F238E27FC236}">
+                <a16:creationId xmlns:a16="http://schemas.microsoft.com/office/drawing/2014/main" id="{709C60CB-DC09-46BC-81EE-61731BAFB739}"/>
+              </a:ext>
+            </a:extLst>
+          </p:cNvPr>
+          <p:cNvSpPr>
+            <a:spLocks noGrp="1"/>
+          </p:cNvSpPr>
+          <p:nvPr>
+            <p:ph idx="1"/>
+          </p:nvPr>
+        </p:nvSpPr>
+        <p:spPr>
+          <a:xfrm>
+            <a:off x="251520" y="1718964"/>
+            <a:ext cx="8640960" cy="4407200"/>
+          </a:xfrm>
+        </p:spPr>
+        <p:txBody>
+          <a:bodyPr/>
+          <a:lstStyle/>
+          <a:p>
+            <a:r>
+              <a:rPr lang="en-US">
+                <a:cs typeface="Calibri"/>
+              </a:rPr>
+              <a:t>Each algorithm has multiple parameters</a:t>
+            </a:r>
+          </a:p>
+          <a:p>
+            <a:r>
+              <a:rPr lang="en-US">
+                <a:cs typeface="Calibri"/>
+              </a:rPr>
+              <a:t>Each parameter can (in most cases) take on multiple options</a:t>
+            </a:r>
+          </a:p>
+          <a:p>
+            <a:r>
+              <a:rPr lang="en-US">
+                <a:cs typeface="Calibri"/>
+              </a:rPr>
+              <a:t>Optimal combination of these parameters is key to obtaining an optimal model</a:t>
+            </a:r>
+            <a:endParaRPr lang="en-US" dirty="0">
+              <a:cs typeface="Calibri"/>
+            </a:endParaRPr>
+          </a:p>
+          <a:p>
+            <a:r>
+              <a:rPr lang="en-US">
+                <a:cs typeface="Calibri"/>
+              </a:rPr>
+              <a:t>But all possible combination of these parameter choices is practically in-exhaustible</a:t>
+            </a:r>
+            <a:endParaRPr lang="en-US" dirty="0">
+              <a:cs typeface="Calibri"/>
+            </a:endParaRPr>
+          </a:p>
+        </p:txBody>
+      </p:sp>
+      <p:sp>
+        <p:nvSpPr>
+          <p:cNvPr id="4" name="Slide Number Placeholder 3">
+            <a:extLst>
+              <a:ext uri="{FF2B5EF4-FFF2-40B4-BE49-F238E27FC236}">
+                <a16:creationId xmlns:a16="http://schemas.microsoft.com/office/drawing/2014/main" id="{4AD703BF-806E-4285-8375-CB1E1E2B7392}"/>
+              </a:ext>
+            </a:extLst>
+          </p:cNvPr>
+          <p:cNvSpPr>
+            <a:spLocks noGrp="1"/>
+          </p:cNvSpPr>
+          <p:nvPr>
+            <p:ph type="sldNum" sz="quarter" idx="10"/>
+          </p:nvPr>
+        </p:nvSpPr>
+        <p:spPr/>
+        <p:txBody>
+          <a:bodyPr/>
+          <a:lstStyle/>
+          <a:p>
+            <a:pPr>
+              <a:defRPr/>
+            </a:pPr>
+            <a:fld id="{953A5B41-6D74-47B9-8560-F73E964C6B20}" type="slidenum">
+              <a:rPr lang="en-GB" altLang="en-US"/>
+              <a:pPr>
+                <a:defRPr/>
+              </a:pPr>
+              <a:t>4</a:t>
+            </a:fld>
+            <a:endParaRPr lang="en-GB" altLang="en-US"/>
+          </a:p>
+        </p:txBody>
+      </p:sp>
+    </p:spTree>
+    <p:extLst>
+      <p:ext uri="{BB962C8B-B14F-4D97-AF65-F5344CB8AC3E}">
+        <p14:creationId xmlns:p14="http://schemas.microsoft.com/office/powerpoint/2010/main" val="1060563233"/>
+      </p:ext>
+    </p:extLst>
+  </p:cSld>
+  <p:clrMapOvr>
+    <a:masterClrMapping/>
+  </p:clrMapOvr>
+</p:sld>
+</file>
+
+<file path=ppt/slides/slide6.xml><?xml version="1.0" encoding="utf-8"?>
+<p:sld xmlns:a="http://schemas.openxmlformats.org/drawingml/2006/main" xmlns:r="http://schemas.openxmlformats.org/officeDocument/2006/relationships" xmlns:p="http://schemas.openxmlformats.org/presentationml/2006/main">
+  <p:cSld>
+    <p:spTree>
+      <p:nvGrpSpPr>
+        <p:cNvPr id="1" name=""/>
+        <p:cNvGrpSpPr/>
+        <p:nvPr/>
+      </p:nvGrpSpPr>
+      <p:grpSpPr>
+        <a:xfrm>
+          <a:off x="0" y="0"/>
+          <a:ext cx="0" cy="0"/>
+          <a:chOff x="0" y="0"/>
+          <a:chExt cx="0" cy="0"/>
+        </a:xfrm>
+      </p:grpSpPr>
+      <p:sp>
+        <p:nvSpPr>
+          <p:cNvPr id="2" name="Title 1">
+            <a:extLst>
+              <a:ext uri="{FF2B5EF4-FFF2-40B4-BE49-F238E27FC236}">
+                <a16:creationId xmlns:a16="http://schemas.microsoft.com/office/drawing/2014/main" id="{B5EC141B-C2EB-44E3-91ED-8C54C55946E8}"/>
+              </a:ext>
+            </a:extLst>
+          </p:cNvPr>
+          <p:cNvSpPr>
+            <a:spLocks noGrp="1"/>
+          </p:cNvSpPr>
+          <p:nvPr>
+            <p:ph type="title"/>
+          </p:nvPr>
+        </p:nvSpPr>
+        <p:spPr>
+          <a:xfrm>
+            <a:off x="251520" y="1196752"/>
+            <a:ext cx="8640960" cy="507474"/>
+          </a:xfrm>
+        </p:spPr>
+        <p:txBody>
+          <a:bodyPr>
+            <a:normAutofit fontScale="90000"/>
+          </a:bodyPr>
+          <a:lstStyle/>
+          <a:p>
+            <a:pPr algn="ctr"/>
+            <a:r>
+              <a:rPr lang="en-US">
+                <a:latin typeface="Arial"/>
+                <a:cs typeface="Arial"/>
+              </a:rPr>
+              <a:t>Parameters example</a:t>
+            </a:r>
+            <a:endParaRPr lang="en-US"/>
+          </a:p>
+        </p:txBody>
+      </p:sp>
+      <p:sp>
+        <p:nvSpPr>
+          <p:cNvPr id="3" name="Content Placeholder 2">
+            <a:extLst>
+              <a:ext uri="{FF2B5EF4-FFF2-40B4-BE49-F238E27FC236}">
+                <a16:creationId xmlns:a16="http://schemas.microsoft.com/office/drawing/2014/main" id="{A63D06AA-6810-47CA-A223-02833B308F4B}"/>
+              </a:ext>
+            </a:extLst>
+          </p:cNvPr>
+          <p:cNvSpPr>
+            <a:spLocks noGrp="1"/>
+          </p:cNvSpPr>
+          <p:nvPr>
+            <p:ph idx="1"/>
+          </p:nvPr>
+        </p:nvSpPr>
+        <p:spPr>
+          <a:xfrm>
+            <a:off x="251520" y="1747421"/>
+            <a:ext cx="8640960" cy="4378743"/>
+          </a:xfrm>
+        </p:spPr>
+        <p:txBody>
+          <a:bodyPr/>
+          <a:lstStyle/>
+          <a:p>
+            <a:r>
+              <a:rPr lang="en-US">
+                <a:cs typeface="Calibri"/>
+              </a:rPr>
+              <a:t>An example of the support vector machine implementation in sklearn</a:t>
+            </a:r>
+          </a:p>
+          <a:p>
+            <a:pPr lvl="1"/>
+            <a:r>
+              <a:rPr lang="en-US" i="1">
+                <a:ea typeface="+mn-lt"/>
+                <a:cs typeface="+mn-lt"/>
+              </a:rPr>
+              <a:t>class </a:t>
+            </a:r>
+            <a:r>
+              <a:rPr lang="en-US">
+                <a:ea typeface="+mn-lt"/>
+                <a:cs typeface="+mn-lt"/>
+              </a:rPr>
+              <a:t>sklearn.svm.SVC(</a:t>
+            </a:r>
+            <a:r>
+              <a:rPr lang="en-US" i="1">
+                <a:ea typeface="+mn-lt"/>
+                <a:cs typeface="+mn-lt"/>
+              </a:rPr>
+              <a:t>C=1.0</a:t>
+            </a:r>
+            <a:r>
+              <a:rPr lang="en-US">
+                <a:ea typeface="+mn-lt"/>
+                <a:cs typeface="+mn-lt"/>
+              </a:rPr>
+              <a:t>, </a:t>
+            </a:r>
+            <a:r>
+              <a:rPr lang="en-US" i="1">
+                <a:ea typeface="+mn-lt"/>
+                <a:cs typeface="+mn-lt"/>
+              </a:rPr>
+              <a:t>kernel=’rbf’</a:t>
+            </a:r>
+            <a:r>
+              <a:rPr lang="en-US">
+                <a:ea typeface="+mn-lt"/>
+                <a:cs typeface="+mn-lt"/>
+              </a:rPr>
+              <a:t>, </a:t>
+            </a:r>
+            <a:r>
+              <a:rPr lang="en-US" i="1">
+                <a:ea typeface="+mn-lt"/>
+                <a:cs typeface="+mn-lt"/>
+              </a:rPr>
+              <a:t>degree=3</a:t>
+            </a:r>
+            <a:r>
+              <a:rPr lang="en-US">
+                <a:ea typeface="+mn-lt"/>
+                <a:cs typeface="+mn-lt"/>
+              </a:rPr>
+              <a:t>, </a:t>
+            </a:r>
+            <a:r>
+              <a:rPr lang="en-US" i="1">
+                <a:ea typeface="+mn-lt"/>
+                <a:cs typeface="+mn-lt"/>
+              </a:rPr>
+              <a:t>gamma=’auto_deprecated’</a:t>
+            </a:r>
+            <a:r>
+              <a:rPr lang="en-US">
+                <a:ea typeface="+mn-lt"/>
+                <a:cs typeface="+mn-lt"/>
+              </a:rPr>
+              <a:t>, </a:t>
+            </a:r>
+            <a:r>
+              <a:rPr lang="en-US" i="1">
+                <a:ea typeface="+mn-lt"/>
+                <a:cs typeface="+mn-lt"/>
+              </a:rPr>
+              <a:t>coef0=0.0</a:t>
+            </a:r>
+            <a:r>
+              <a:rPr lang="en-US">
+                <a:ea typeface="+mn-lt"/>
+                <a:cs typeface="+mn-lt"/>
+              </a:rPr>
+              <a:t>, </a:t>
+            </a:r>
+            <a:r>
+              <a:rPr lang="en-US" i="1">
+                <a:ea typeface="+mn-lt"/>
+                <a:cs typeface="+mn-lt"/>
+              </a:rPr>
+              <a:t>shrinking=True</a:t>
+            </a:r>
+            <a:r>
+              <a:rPr lang="en-US">
+                <a:ea typeface="+mn-lt"/>
+                <a:cs typeface="+mn-lt"/>
+              </a:rPr>
+              <a:t>, </a:t>
+            </a:r>
+            <a:r>
+              <a:rPr lang="en-US" i="1">
+                <a:ea typeface="+mn-lt"/>
+                <a:cs typeface="+mn-lt"/>
+              </a:rPr>
+              <a:t>probability=False</a:t>
+            </a:r>
+            <a:r>
+              <a:rPr lang="en-US">
+                <a:ea typeface="+mn-lt"/>
+                <a:cs typeface="+mn-lt"/>
+              </a:rPr>
+              <a:t>, </a:t>
+            </a:r>
+            <a:r>
+              <a:rPr lang="en-US" i="1">
+                <a:ea typeface="+mn-lt"/>
+                <a:cs typeface="+mn-lt"/>
+              </a:rPr>
+              <a:t>tol=0.001</a:t>
+            </a:r>
+            <a:r>
+              <a:rPr lang="en-US">
+                <a:ea typeface="+mn-lt"/>
+                <a:cs typeface="+mn-lt"/>
+              </a:rPr>
+              <a:t>, </a:t>
+            </a:r>
+            <a:r>
+              <a:rPr lang="en-US" i="1">
+                <a:ea typeface="+mn-lt"/>
+                <a:cs typeface="+mn-lt"/>
+              </a:rPr>
+              <a:t>cache_size=200</a:t>
+            </a:r>
+            <a:r>
+              <a:rPr lang="en-US">
+                <a:ea typeface="+mn-lt"/>
+                <a:cs typeface="+mn-lt"/>
+              </a:rPr>
+              <a:t>, </a:t>
+            </a:r>
+            <a:r>
+              <a:rPr lang="en-US" i="1">
+                <a:ea typeface="+mn-lt"/>
+                <a:cs typeface="+mn-lt"/>
+              </a:rPr>
+              <a:t>class_weight=None</a:t>
+            </a:r>
+            <a:r>
+              <a:rPr lang="en-US">
+                <a:ea typeface="+mn-lt"/>
+                <a:cs typeface="+mn-lt"/>
+              </a:rPr>
+              <a:t>, </a:t>
+            </a:r>
+            <a:r>
+              <a:rPr lang="en-US" i="1">
+                <a:ea typeface="+mn-lt"/>
+                <a:cs typeface="+mn-lt"/>
+              </a:rPr>
+              <a:t>verbose=False</a:t>
+            </a:r>
+            <a:r>
+              <a:rPr lang="en-US">
+                <a:ea typeface="+mn-lt"/>
+                <a:cs typeface="+mn-lt"/>
+              </a:rPr>
+              <a:t>, </a:t>
+            </a:r>
+            <a:r>
+              <a:rPr lang="en-US" i="1">
+                <a:ea typeface="+mn-lt"/>
+                <a:cs typeface="+mn-lt"/>
+              </a:rPr>
+              <a:t>max_iter=-1</a:t>
+            </a:r>
+            <a:r>
+              <a:rPr lang="en-US">
+                <a:ea typeface="+mn-lt"/>
+                <a:cs typeface="+mn-lt"/>
+              </a:rPr>
+              <a:t>, </a:t>
+            </a:r>
+            <a:r>
+              <a:rPr lang="en-US" i="1">
+                <a:ea typeface="+mn-lt"/>
+                <a:cs typeface="+mn-lt"/>
+              </a:rPr>
+              <a:t>decision_function_shape=’ovr’</a:t>
+            </a:r>
+            <a:r>
+              <a:rPr lang="en-US">
+                <a:ea typeface="+mn-lt"/>
+                <a:cs typeface="+mn-lt"/>
+              </a:rPr>
+              <a:t>, </a:t>
+            </a:r>
+            <a:r>
+              <a:rPr lang="en-US" i="1">
+                <a:ea typeface="+mn-lt"/>
+                <a:cs typeface="+mn-lt"/>
+              </a:rPr>
+              <a:t>random_state=None</a:t>
+            </a:r>
+            <a:r>
+              <a:rPr lang="en-US">
+                <a:ea typeface="+mn-lt"/>
+                <a:cs typeface="+mn-lt"/>
+              </a:rPr>
+              <a:t>)</a:t>
+            </a:r>
+            <a:endParaRPr lang="en-US" dirty="0">
+              <a:cs typeface="Calibri"/>
+            </a:endParaRPr>
+          </a:p>
+        </p:txBody>
+      </p:sp>
+      <p:sp>
+        <p:nvSpPr>
+          <p:cNvPr id="4" name="Slide Number Placeholder 3">
+            <a:extLst>
+              <a:ext uri="{FF2B5EF4-FFF2-40B4-BE49-F238E27FC236}">
+                <a16:creationId xmlns:a16="http://schemas.microsoft.com/office/drawing/2014/main" id="{4DF14D75-0536-4471-8E0C-A6F8029DE145}"/>
+              </a:ext>
+            </a:extLst>
+          </p:cNvPr>
+          <p:cNvSpPr>
+            <a:spLocks noGrp="1"/>
+          </p:cNvSpPr>
+          <p:nvPr>
+            <p:ph type="sldNum" sz="quarter" idx="10"/>
+          </p:nvPr>
+        </p:nvSpPr>
+        <p:spPr/>
+        <p:txBody>
+          <a:bodyPr/>
+          <a:lstStyle/>
+          <a:p>
+            <a:pPr>
+              <a:defRPr/>
+            </a:pPr>
+            <a:fld id="{953A5B41-6D74-47B9-8560-F73E964C6B20}" type="slidenum">
+              <a:rPr lang="en-GB" altLang="en-US"/>
+              <a:pPr>
+                <a:defRPr/>
+              </a:pPr>
+              <a:t>5</a:t>
+            </a:fld>
+            <a:endParaRPr lang="en-GB" altLang="en-US"/>
+          </a:p>
+        </p:txBody>
+      </p:sp>
+    </p:spTree>
+    <p:extLst>
+      <p:ext uri="{BB962C8B-B14F-4D97-AF65-F5344CB8AC3E}">
+        <p14:creationId xmlns:p14="http://schemas.microsoft.com/office/powerpoint/2010/main" val="2724080666"/>
+      </p:ext>
+    </p:extLst>
+  </p:cSld>
+  <p:clrMapOvr>
+    <a:masterClrMapping/>
+  </p:clrMapOvr>
+</p:sld>
+</file>
+
+<file path=ppt/slides/slide7.xml><?xml version="1.0" encoding="utf-8"?>
+<p:sld xmlns:a="http://schemas.openxmlformats.org/drawingml/2006/main" xmlns:r="http://schemas.openxmlformats.org/officeDocument/2006/relationships" xmlns:p="http://schemas.openxmlformats.org/presentationml/2006/main">
+  <p:cSld>
+    <p:spTree>
+      <p:nvGrpSpPr>
+        <p:cNvPr id="1" name=""/>
+        <p:cNvGrpSpPr/>
+        <p:nvPr/>
+      </p:nvGrpSpPr>
+      <p:grpSpPr>
+        <a:xfrm>
+          <a:off x="0" y="0"/>
+          <a:ext cx="0" cy="0"/>
+          <a:chOff x="0" y="0"/>
+          <a:chExt cx="0" cy="0"/>
+        </a:xfrm>
+      </p:grpSpPr>
+      <p:sp>
+        <p:nvSpPr>
+          <p:cNvPr id="2" name="Content Placeholder 1">
+            <a:extLst>
+              <a:ext uri="{FF2B5EF4-FFF2-40B4-BE49-F238E27FC236}">
+                <a16:creationId xmlns:a16="http://schemas.microsoft.com/office/drawing/2014/main" id="{3E46F840-00AF-47D6-B550-BA72CF7314C1}"/>
+              </a:ext>
+            </a:extLst>
+          </p:cNvPr>
+          <p:cNvSpPr>
+            <a:spLocks noGrp="1"/>
+          </p:cNvSpPr>
+          <p:nvPr>
+            <p:ph sz="half" idx="1"/>
+          </p:nvPr>
+        </p:nvSpPr>
+        <p:spPr>
+          <a:xfrm>
+            <a:off x="457200" y="1583515"/>
+            <a:ext cx="4038600" cy="4355225"/>
+          </a:xfrm>
+        </p:spPr>
+        <p:txBody>
+          <a:bodyPr/>
+          <a:lstStyle/>
+          <a:p>
+            <a:r>
+              <a:rPr lang="en-US" b="1">
+                <a:ea typeface="+mn-lt"/>
+                <a:cs typeface="+mn-lt"/>
+              </a:rPr>
+              <a:t>C</a:t>
+            </a:r>
+            <a:r>
+              <a:rPr lang="en-US">
+                <a:ea typeface="+mn-lt"/>
+                <a:cs typeface="+mn-lt"/>
+              </a:rPr>
+              <a:t> : float</a:t>
+            </a:r>
+            <a:endParaRPr lang="en-US">
+              <a:cs typeface="Calibri"/>
+            </a:endParaRPr>
+          </a:p>
+          <a:p>
+            <a:r>
+              <a:rPr lang="en-US" b="1">
+                <a:ea typeface="+mn-lt"/>
+                <a:cs typeface="+mn-lt"/>
+              </a:rPr>
+              <a:t>kernel</a:t>
+            </a:r>
+            <a:r>
+              <a:rPr lang="en-US">
+                <a:ea typeface="+mn-lt"/>
+                <a:cs typeface="+mn-lt"/>
+              </a:rPr>
+              <a:t> : string</a:t>
+            </a:r>
+            <a:endParaRPr lang="en-US">
+              <a:cs typeface="Calibri"/>
+            </a:endParaRPr>
+          </a:p>
+          <a:p>
+            <a:r>
+              <a:rPr lang="en-US" b="1">
+                <a:ea typeface="+mn-lt"/>
+                <a:cs typeface="+mn-lt"/>
+              </a:rPr>
+              <a:t>degree</a:t>
+            </a:r>
+            <a:r>
+              <a:rPr lang="en-US">
+                <a:ea typeface="+mn-lt"/>
+                <a:cs typeface="+mn-lt"/>
+              </a:rPr>
+              <a:t> : int</a:t>
+            </a:r>
+            <a:endParaRPr lang="en-US">
+              <a:cs typeface="Calibri"/>
+            </a:endParaRPr>
+          </a:p>
+          <a:p>
+            <a:r>
+              <a:rPr lang="en-US" b="1">
+                <a:ea typeface="+mn-lt"/>
+                <a:cs typeface="+mn-lt"/>
+              </a:rPr>
+              <a:t>gamma</a:t>
+            </a:r>
+            <a:r>
+              <a:rPr lang="en-US">
+                <a:ea typeface="+mn-lt"/>
+                <a:cs typeface="+mn-lt"/>
+              </a:rPr>
+              <a:t> : float </a:t>
+            </a:r>
+            <a:endParaRPr lang="en-US" dirty="0">
+              <a:ea typeface="+mn-lt"/>
+              <a:cs typeface="+mn-lt"/>
+            </a:endParaRPr>
+          </a:p>
+          <a:p>
+            <a:r>
+              <a:rPr lang="en-US" b="1">
+                <a:ea typeface="+mn-lt"/>
+                <a:cs typeface="+mn-lt"/>
+              </a:rPr>
+              <a:t>coef0</a:t>
+            </a:r>
+            <a:r>
+              <a:rPr lang="en-US">
+                <a:ea typeface="+mn-lt"/>
+                <a:cs typeface="+mn-lt"/>
+              </a:rPr>
+              <a:t> : float</a:t>
+            </a:r>
+            <a:endParaRPr lang="en-US" dirty="0">
+              <a:cs typeface="Calibri"/>
+            </a:endParaRPr>
+          </a:p>
+          <a:p>
+            <a:r>
+              <a:rPr lang="en-US" b="1">
+                <a:ea typeface="+mn-lt"/>
+                <a:cs typeface="+mn-lt"/>
+              </a:rPr>
+              <a:t>shrinking</a:t>
+            </a:r>
+            <a:r>
+              <a:rPr lang="en-US">
+                <a:ea typeface="+mn-lt"/>
+                <a:cs typeface="+mn-lt"/>
+              </a:rPr>
+              <a:t> : boolean</a:t>
+            </a:r>
+            <a:endParaRPr lang="en-US" dirty="0">
+              <a:cs typeface="Calibri"/>
+            </a:endParaRPr>
+          </a:p>
+          <a:p>
+            <a:r>
+              <a:rPr lang="en-US" b="1">
+                <a:ea typeface="+mn-lt"/>
+                <a:cs typeface="+mn-lt"/>
+              </a:rPr>
+              <a:t>random_state</a:t>
+            </a:r>
+            <a:r>
+              <a:rPr lang="en-US">
+                <a:ea typeface="+mn-lt"/>
+                <a:cs typeface="+mn-lt"/>
+              </a:rPr>
+              <a:t> : int</a:t>
+            </a:r>
+            <a:endParaRPr lang="en-US" dirty="0">
+              <a:ea typeface="+mn-lt"/>
+              <a:cs typeface="+mn-lt"/>
+            </a:endParaRPr>
+          </a:p>
+          <a:p>
+            <a:endParaRPr lang="en-US" dirty="0">
+              <a:cs typeface="Calibri"/>
+            </a:endParaRPr>
+          </a:p>
+        </p:txBody>
+      </p:sp>
+      <p:sp>
+        <p:nvSpPr>
+          <p:cNvPr id="3" name="Content Placeholder 2">
+            <a:extLst>
+              <a:ext uri="{FF2B5EF4-FFF2-40B4-BE49-F238E27FC236}">
+                <a16:creationId xmlns:a16="http://schemas.microsoft.com/office/drawing/2014/main" id="{B111964B-DDD2-4AF0-B15A-1AFD5E191B07}"/>
+              </a:ext>
+            </a:extLst>
+          </p:cNvPr>
+          <p:cNvSpPr>
+            <a:spLocks noGrp="1"/>
+          </p:cNvSpPr>
+          <p:nvPr>
+            <p:ph sz="half" idx="2"/>
+          </p:nvPr>
+        </p:nvSpPr>
+        <p:spPr>
+          <a:xfrm>
+            <a:off x="4648200" y="1583515"/>
+            <a:ext cx="4038600" cy="4355225"/>
+          </a:xfrm>
+        </p:spPr>
+        <p:txBody>
+          <a:bodyPr/>
+          <a:lstStyle/>
+          <a:p>
+            <a:r>
+              <a:rPr lang="en-US" b="1">
+                <a:ea typeface="+mn-lt"/>
+                <a:cs typeface="+mn-lt"/>
+              </a:rPr>
+              <a:t>probability</a:t>
+            </a:r>
+            <a:r>
+              <a:rPr lang="en-US">
+                <a:ea typeface="+mn-lt"/>
+                <a:cs typeface="+mn-lt"/>
+              </a:rPr>
+              <a:t> : boolean</a:t>
+            </a:r>
+          </a:p>
+          <a:p>
+            <a:r>
+              <a:rPr lang="en-US" b="1">
+                <a:ea typeface="+mn-lt"/>
+                <a:cs typeface="+mn-lt"/>
+              </a:rPr>
+              <a:t>tol</a:t>
+            </a:r>
+            <a:r>
+              <a:rPr lang="en-US">
+                <a:ea typeface="+mn-lt"/>
+                <a:cs typeface="+mn-lt"/>
+              </a:rPr>
+              <a:t> : float</a:t>
+            </a:r>
+            <a:endParaRPr lang="en-US" dirty="0">
+              <a:ea typeface="+mn-lt"/>
+              <a:cs typeface="+mn-lt"/>
+            </a:endParaRPr>
+          </a:p>
+          <a:p>
+            <a:r>
+              <a:rPr lang="en-US" b="1">
+                <a:ea typeface="+mn-lt"/>
+                <a:cs typeface="+mn-lt"/>
+              </a:rPr>
+              <a:t>cache_size</a:t>
+            </a:r>
+            <a:r>
+              <a:rPr lang="en-US">
+                <a:ea typeface="+mn-lt"/>
+                <a:cs typeface="+mn-lt"/>
+              </a:rPr>
+              <a:t> : float</a:t>
+            </a:r>
+          </a:p>
+          <a:p>
+            <a:r>
+              <a:rPr lang="en-US" b="1">
+                <a:ea typeface="+mn-lt"/>
+                <a:cs typeface="+mn-lt"/>
+              </a:rPr>
+              <a:t>class_weight</a:t>
+            </a:r>
+            <a:r>
+              <a:rPr lang="en-US">
+                <a:ea typeface="+mn-lt"/>
+                <a:cs typeface="+mn-lt"/>
+              </a:rPr>
+              <a:t> : {dict, ‘balanced’}</a:t>
+            </a:r>
+          </a:p>
+          <a:p>
+            <a:r>
+              <a:rPr lang="en-US" b="1">
+                <a:ea typeface="+mn-lt"/>
+                <a:cs typeface="+mn-lt"/>
+              </a:rPr>
+              <a:t>verbose</a:t>
+            </a:r>
+            <a:r>
+              <a:rPr lang="en-US">
+                <a:ea typeface="+mn-lt"/>
+                <a:cs typeface="+mn-lt"/>
+              </a:rPr>
+              <a:t> : bool</a:t>
+            </a:r>
+          </a:p>
+          <a:p>
+            <a:r>
+              <a:rPr lang="en-US" b="1">
+                <a:ea typeface="+mn-lt"/>
+                <a:cs typeface="+mn-lt"/>
+              </a:rPr>
+              <a:t>max_iter</a:t>
+            </a:r>
+            <a:r>
+              <a:rPr lang="en-US">
+                <a:ea typeface="+mn-lt"/>
+                <a:cs typeface="+mn-lt"/>
+              </a:rPr>
+              <a:t> : int</a:t>
+            </a:r>
+          </a:p>
+          <a:p>
+            <a:r>
+              <a:rPr lang="en-US" b="1">
+                <a:ea typeface="+mn-lt"/>
+                <a:cs typeface="+mn-lt"/>
+              </a:rPr>
+              <a:t>decision_function_shape</a:t>
+            </a:r>
+            <a:r>
+              <a:rPr lang="en-US">
+                <a:ea typeface="+mn-lt"/>
+                <a:cs typeface="+mn-lt"/>
+              </a:rPr>
+              <a:t> : ‘ovo’, ‘ovr’</a:t>
+            </a:r>
+            <a:endParaRPr lang="en-US" dirty="0">
+              <a:ea typeface="+mn-lt"/>
+              <a:cs typeface="+mn-lt"/>
+            </a:endParaRPr>
+          </a:p>
+        </p:txBody>
+      </p:sp>
+      <p:sp>
+        <p:nvSpPr>
+          <p:cNvPr id="4" name="Slide Number Placeholder 3">
+            <a:extLst>
+              <a:ext uri="{FF2B5EF4-FFF2-40B4-BE49-F238E27FC236}">
+                <a16:creationId xmlns:a16="http://schemas.microsoft.com/office/drawing/2014/main" id="{3A84B29B-3EDC-4F97-A65A-54B43A8044C5}"/>
+              </a:ext>
+            </a:extLst>
+          </p:cNvPr>
+          <p:cNvSpPr>
+            <a:spLocks noGrp="1"/>
+          </p:cNvSpPr>
+          <p:nvPr>
+            <p:ph type="sldNum" sz="quarter" idx="10"/>
+          </p:nvPr>
+        </p:nvSpPr>
+        <p:spPr/>
+        <p:txBody>
+          <a:bodyPr/>
+          <a:lstStyle/>
+          <a:p>
+            <a:pPr>
+              <a:defRPr/>
+            </a:pPr>
+            <a:fld id="{1BD7A454-CB32-4E38-B84D-A92B3AF364F7}" type="slidenum">
+              <a:rPr lang="en-GB" altLang="en-US"/>
+              <a:pPr>
+                <a:defRPr/>
+              </a:pPr>
+              <a:t>6</a:t>
+            </a:fld>
+            <a:endParaRPr lang="en-GB" altLang="en-US"/>
+          </a:p>
+        </p:txBody>
+      </p:sp>
+      <p:sp>
+        <p:nvSpPr>
+          <p:cNvPr id="6" name="Title 1">
+            <a:extLst>
+              <a:ext uri="{FF2B5EF4-FFF2-40B4-BE49-F238E27FC236}">
+                <a16:creationId xmlns:a16="http://schemas.microsoft.com/office/drawing/2014/main" id="{E7F35D54-A345-4508-BC90-78725F94F748}"/>
+              </a:ext>
+            </a:extLst>
+          </p:cNvPr>
+          <p:cNvSpPr txBox="1">
+            <a:spLocks/>
+          </p:cNvSpPr>
+          <p:nvPr/>
+        </p:nvSpPr>
+        <p:spPr>
+          <a:xfrm>
+            <a:off x="289462" y="1073441"/>
+            <a:ext cx="8640960" cy="507474"/>
+          </a:xfrm>
+          <a:prstGeom prst="rect">
+            <a:avLst/>
+          </a:prstGeom>
+        </p:spPr>
+        <p:txBody>
+          <a:bodyPr>
+            <a:normAutofit fontScale="90000" lnSpcReduction="10000"/>
+          </a:bodyPr>
+          <a:lstStyle>
+            <a:lvl1pPr algn="l" rtl="0" eaLnBrk="0" fontAlgn="base" hangingPunct="0">
+              <a:spcBef>
+                <a:spcPct val="0"/>
+              </a:spcBef>
+              <a:spcAft>
+                <a:spcPct val="0"/>
+              </a:spcAft>
+              <a:defRPr sz="3200" kern="1200">
+                <a:solidFill>
+                  <a:srgbClr val="9A1D2B"/>
+                </a:solidFill>
+                <a:latin typeface="Arial" pitchFamily="34" charset="0"/>
+                <a:ea typeface="+mj-ea"/>
+                <a:cs typeface="Arial" pitchFamily="34" charset="0"/>
+              </a:defRPr>
+            </a:lvl1pPr>
+            <a:lvl2pPr algn="l" rtl="0" eaLnBrk="0" fontAlgn="base" hangingPunct="0">
+              <a:spcBef>
+                <a:spcPct val="0"/>
+              </a:spcBef>
+              <a:spcAft>
+                <a:spcPct val="0"/>
+              </a:spcAft>
+              <a:defRPr sz="3200">
+                <a:solidFill>
+                  <a:srgbClr val="9A1D2B"/>
+                </a:solidFill>
+                <a:latin typeface="Arial" charset="0"/>
+                <a:cs typeface="Arial" charset="0"/>
+              </a:defRPr>
+            </a:lvl2pPr>
+            <a:lvl3pPr algn="l" rtl="0" eaLnBrk="0" fontAlgn="base" hangingPunct="0">
+              <a:spcBef>
+                <a:spcPct val="0"/>
+              </a:spcBef>
+              <a:spcAft>
+                <a:spcPct val="0"/>
+              </a:spcAft>
+              <a:defRPr sz="3200">
+                <a:solidFill>
+                  <a:srgbClr val="9A1D2B"/>
+                </a:solidFill>
+                <a:latin typeface="Arial" charset="0"/>
+                <a:cs typeface="Arial" charset="0"/>
+              </a:defRPr>
+            </a:lvl3pPr>
+            <a:lvl4pPr algn="l" rtl="0" eaLnBrk="0" fontAlgn="base" hangingPunct="0">
+              <a:spcBef>
+                <a:spcPct val="0"/>
+              </a:spcBef>
+              <a:spcAft>
+                <a:spcPct val="0"/>
+              </a:spcAft>
+              <a:defRPr sz="3200">
+                <a:solidFill>
+                  <a:srgbClr val="9A1D2B"/>
+                </a:solidFill>
+                <a:latin typeface="Arial" charset="0"/>
+                <a:cs typeface="Arial" charset="0"/>
+              </a:defRPr>
+            </a:lvl4pPr>
+            <a:lvl5pPr algn="l" rtl="0" eaLnBrk="0" fontAlgn="base" hangingPunct="0">
+              <a:spcBef>
+                <a:spcPct val="0"/>
+              </a:spcBef>
+              <a:spcAft>
+                <a:spcPct val="0"/>
+              </a:spcAft>
+              <a:defRPr sz="3200">
+                <a:solidFill>
+                  <a:srgbClr val="9A1D2B"/>
+                </a:solidFill>
+                <a:latin typeface="Arial" charset="0"/>
+                <a:cs typeface="Arial" charset="0"/>
+              </a:defRPr>
+            </a:lvl5pPr>
+            <a:lvl6pPr marL="457200" algn="l" rtl="0" fontAlgn="base">
+              <a:spcBef>
+                <a:spcPct val="0"/>
+              </a:spcBef>
+              <a:spcAft>
+                <a:spcPct val="0"/>
+              </a:spcAft>
+              <a:defRPr sz="3200">
+                <a:solidFill>
+                  <a:srgbClr val="9A1D2B"/>
+                </a:solidFill>
+                <a:latin typeface="Arial" charset="0"/>
+                <a:cs typeface="Arial" charset="0"/>
+              </a:defRPr>
+            </a:lvl6pPr>
+            <a:lvl7pPr marL="914400" algn="l" rtl="0" fontAlgn="base">
+              <a:spcBef>
+                <a:spcPct val="0"/>
+              </a:spcBef>
+              <a:spcAft>
+                <a:spcPct val="0"/>
+              </a:spcAft>
+              <a:defRPr sz="3200">
+                <a:solidFill>
+                  <a:srgbClr val="9A1D2B"/>
+                </a:solidFill>
+                <a:latin typeface="Arial" charset="0"/>
+                <a:cs typeface="Arial" charset="0"/>
+              </a:defRPr>
+            </a:lvl7pPr>
+            <a:lvl8pPr marL="1371600" algn="l" rtl="0" fontAlgn="base">
+              <a:spcBef>
+                <a:spcPct val="0"/>
+              </a:spcBef>
+              <a:spcAft>
+                <a:spcPct val="0"/>
+              </a:spcAft>
+              <a:defRPr sz="3200">
+                <a:solidFill>
+                  <a:srgbClr val="9A1D2B"/>
+                </a:solidFill>
+                <a:latin typeface="Arial" charset="0"/>
+                <a:cs typeface="Arial" charset="0"/>
+              </a:defRPr>
+            </a:lvl8pPr>
+            <a:lvl9pPr marL="1828800" algn="l" rtl="0" fontAlgn="base">
+              <a:spcBef>
+                <a:spcPct val="0"/>
+              </a:spcBef>
+              <a:spcAft>
+                <a:spcPct val="0"/>
+              </a:spcAft>
+              <a:defRPr sz="3200">
+                <a:solidFill>
+                  <a:srgbClr val="9A1D2B"/>
+                </a:solidFill>
+                <a:latin typeface="Arial" charset="0"/>
+                <a:cs typeface="Arial" charset="0"/>
+              </a:defRPr>
+            </a:lvl9pPr>
+          </a:lstStyle>
+          <a:p>
+            <a:pPr algn="ctr"/>
+            <a:r>
+              <a:rPr lang="en-US">
+                <a:latin typeface="Arial"/>
+                <a:cs typeface="Arial"/>
+              </a:rPr>
+              <a:t>Parameters example</a:t>
+            </a:r>
+            <a:endParaRPr lang="en-US"/>
+          </a:p>
+        </p:txBody>
+      </p:sp>
+    </p:spTree>
+    <p:extLst>
+      <p:ext uri="{BB962C8B-B14F-4D97-AF65-F5344CB8AC3E}">
+        <p14:creationId xmlns:p14="http://schemas.microsoft.com/office/powerpoint/2010/main" val="3367678221"/>
+      </p:ext>
+    </p:extLst>
+  </p:cSld>
+  <p:clrMapOvr>
+    <a:masterClrMapping/>
+  </p:clrMapOvr>
+</p:sld>
+</file>
+
+<file path=ppt/slides/slide8.xml><?xml version="1.0" encoding="utf-8"?>
+<p:sld xmlns:a="http://schemas.openxmlformats.org/drawingml/2006/main" xmlns:r="http://schemas.openxmlformats.org/officeDocument/2006/relationships" xmlns:p="http://schemas.openxmlformats.org/presentationml/2006/main">
+  <p:cSld>
+    <p:spTree>
+      <p:nvGrpSpPr>
+        <p:cNvPr id="1" name=""/>
+        <p:cNvGrpSpPr/>
+        <p:nvPr/>
+      </p:nvGrpSpPr>
+      <p:grpSpPr>
+        <a:xfrm>
+          <a:off x="0" y="0"/>
+          <a:ext cx="0" cy="0"/>
+          <a:chOff x="0" y="0"/>
+          <a:chExt cx="0" cy="0"/>
+        </a:xfrm>
+      </p:grpSpPr>
+      <p:sp>
+        <p:nvSpPr>
+          <p:cNvPr id="2" name="Title 1">
+            <a:extLst>
+              <a:ext uri="{FF2B5EF4-FFF2-40B4-BE49-F238E27FC236}">
+                <a16:creationId xmlns:a16="http://schemas.microsoft.com/office/drawing/2014/main" id="{B5EC141B-C2EB-44E3-91ED-8C54C55946E8}"/>
+              </a:ext>
+            </a:extLst>
+          </p:cNvPr>
+          <p:cNvSpPr>
+            <a:spLocks noGrp="1"/>
+          </p:cNvSpPr>
+          <p:nvPr>
+            <p:ph type="title"/>
+          </p:nvPr>
+        </p:nvSpPr>
+        <p:spPr>
+          <a:xfrm>
+            <a:off x="251520" y="1196752"/>
+            <a:ext cx="8640960" cy="507474"/>
+          </a:xfrm>
+        </p:spPr>
+        <p:txBody>
+          <a:bodyPr>
+            <a:normAutofit fontScale="90000"/>
+          </a:bodyPr>
+          <a:lstStyle/>
+          <a:p>
+            <a:pPr algn="ctr"/>
+            <a:r>
+              <a:rPr lang="en-US">
+                <a:latin typeface="Arial"/>
+                <a:cs typeface="Arial"/>
+              </a:rPr>
+              <a:t>Grid search</a:t>
+            </a:r>
+            <a:endParaRPr lang="en-US" dirty="0"/>
+          </a:p>
+        </p:txBody>
+      </p:sp>
+      <p:sp>
+        <p:nvSpPr>
+          <p:cNvPr id="3" name="Content Placeholder 2">
+            <a:extLst>
+              <a:ext uri="{FF2B5EF4-FFF2-40B4-BE49-F238E27FC236}">
+                <a16:creationId xmlns:a16="http://schemas.microsoft.com/office/drawing/2014/main" id="{A63D06AA-6810-47CA-A223-02833B308F4B}"/>
+              </a:ext>
+            </a:extLst>
+          </p:cNvPr>
+          <p:cNvSpPr>
+            <a:spLocks noGrp="1"/>
+          </p:cNvSpPr>
+          <p:nvPr>
+            <p:ph idx="1"/>
+          </p:nvPr>
+        </p:nvSpPr>
+        <p:spPr>
+          <a:xfrm>
+            <a:off x="251520" y="1747421"/>
+            <a:ext cx="8640960" cy="4378743"/>
+          </a:xfrm>
+        </p:spPr>
+        <p:txBody>
+          <a:bodyPr/>
+          <a:lstStyle/>
+          <a:p>
+            <a:r>
+              <a:rPr lang="en-US">
+                <a:solidFill>
+                  <a:srgbClr val="000000"/>
+                </a:solidFill>
+                <a:cs typeface="Calibri"/>
+              </a:rPr>
+              <a:t>An extensive multi-parameter search approach used in machine learning to determine an optimal combination of given parameter values.</a:t>
+            </a:r>
+          </a:p>
+          <a:p>
+            <a:endParaRPr lang="en-US" dirty="0">
+              <a:solidFill>
+                <a:srgbClr val="000000"/>
+              </a:solidFill>
+              <a:cs typeface="Calibri"/>
+            </a:endParaRPr>
+          </a:p>
+          <a:p>
+            <a:r>
+              <a:rPr lang="en-US">
+                <a:solidFill>
+                  <a:srgbClr val="000000"/>
+                </a:solidFill>
+                <a:cs typeface="Calibri"/>
+              </a:rPr>
+              <a:t>The search develops models with the different parameters combined and evaluate against each other</a:t>
+            </a:r>
+            <a:endParaRPr lang="en-US" dirty="0">
+              <a:solidFill>
+                <a:srgbClr val="000000"/>
+              </a:solidFill>
+              <a:cs typeface="Calibri"/>
+            </a:endParaRPr>
+          </a:p>
+        </p:txBody>
+      </p:sp>
+      <p:sp>
+        <p:nvSpPr>
+          <p:cNvPr id="4" name="Slide Number Placeholder 3">
+            <a:extLst>
+              <a:ext uri="{FF2B5EF4-FFF2-40B4-BE49-F238E27FC236}">
+                <a16:creationId xmlns:a16="http://schemas.microsoft.com/office/drawing/2014/main" id="{4DF14D75-0536-4471-8E0C-A6F8029DE145}"/>
+              </a:ext>
+            </a:extLst>
+          </p:cNvPr>
+          <p:cNvSpPr>
+            <a:spLocks noGrp="1"/>
+          </p:cNvSpPr>
+          <p:nvPr>
+            <p:ph type="sldNum" sz="quarter" idx="10"/>
+          </p:nvPr>
+        </p:nvSpPr>
+        <p:spPr/>
+        <p:txBody>
+          <a:bodyPr/>
+          <a:lstStyle/>
+          <a:p>
+            <a:pPr>
+              <a:defRPr/>
+            </a:pPr>
+            <a:fld id="{953A5B41-6D74-47B9-8560-F73E964C6B20}" type="slidenum">
+              <a:rPr lang="en-GB" altLang="en-US"/>
+              <a:pPr>
+                <a:defRPr/>
+              </a:pPr>
+              <a:t>7</a:t>
+            </a:fld>
+            <a:endParaRPr lang="en-GB" altLang="en-US"/>
+          </a:p>
+        </p:txBody>
+      </p:sp>
+    </p:spTree>
+    <p:extLst>
+      <p:ext uri="{BB962C8B-B14F-4D97-AF65-F5344CB8AC3E}">
+        <p14:creationId xmlns:p14="http://schemas.microsoft.com/office/powerpoint/2010/main" val="1314439175"/>
+      </p:ext>
+    </p:extLst>
+  </p:cSld>
+  <p:clrMapOvr>
+    <a:masterClrMapping/>
+  </p:clrMapOvr>
+</p:sld>
+</file>
+
+<file path=ppt/slides/slide9.xml><?xml version="1.0" encoding="utf-8"?>
+<p:sld xmlns:a="http://schemas.openxmlformats.org/drawingml/2006/main" xmlns:r="http://schemas.openxmlformats.org/officeDocument/2006/relationships" xmlns:p="http://schemas.openxmlformats.org/presentationml/2006/main">
+  <p:cSld>
+    <p:spTree>
+      <p:nvGrpSpPr>
+        <p:cNvPr id="1" name=""/>
+        <p:cNvGrpSpPr/>
+        <p:nvPr/>
+      </p:nvGrpSpPr>
+      <p:grpSpPr>
+        <a:xfrm>
+          <a:off x="0" y="0"/>
+          <a:ext cx="0" cy="0"/>
+          <a:chOff x="0" y="0"/>
+          <a:chExt cx="0" cy="0"/>
+        </a:xfrm>
+      </p:grpSpPr>
+      <p:sp>
+        <p:nvSpPr>
+          <p:cNvPr id="2" name="Title 1">
+            <a:extLst>
+              <a:ext uri="{FF2B5EF4-FFF2-40B4-BE49-F238E27FC236}">
+                <a16:creationId xmlns:a16="http://schemas.microsoft.com/office/drawing/2014/main" id="{E6C22751-A4D8-4504-98ED-E39B9AF019CB}"/>
+              </a:ext>
+            </a:extLst>
+          </p:cNvPr>
+          <p:cNvSpPr>
+            <a:spLocks noGrp="1"/>
+          </p:cNvSpPr>
+          <p:nvPr>
+            <p:ph type="title"/>
+          </p:nvPr>
+        </p:nvSpPr>
+        <p:spPr>
+          <a:xfrm>
+            <a:off x="251520" y="1196752"/>
+            <a:ext cx="8640960" cy="545415"/>
+          </a:xfrm>
+        </p:spPr>
+        <p:txBody>
+          <a:bodyPr>
+            <a:normAutofit fontScale="90000"/>
+          </a:bodyPr>
+          <a:lstStyle/>
+          <a:p>
+            <a:pPr algn="ctr"/>
+            <a:r>
+              <a:rPr lang="en-US">
+                <a:latin typeface="Arial"/>
+                <a:cs typeface="Arial"/>
+              </a:rPr>
+              <a:t>Grid search and cross validation</a:t>
+            </a:r>
+            <a:endParaRPr lang="en-US"/>
+          </a:p>
+        </p:txBody>
+      </p:sp>
+      <p:sp>
+        <p:nvSpPr>
+          <p:cNvPr id="3" name="Content Placeholder 2">
+            <a:extLst>
+              <a:ext uri="{FF2B5EF4-FFF2-40B4-BE49-F238E27FC236}">
+                <a16:creationId xmlns:a16="http://schemas.microsoft.com/office/drawing/2014/main" id="{4B45B5C9-8A4B-4B0F-8B89-2335ED25FCE7}"/>
+              </a:ext>
+            </a:extLst>
+          </p:cNvPr>
+          <p:cNvSpPr>
+            <a:spLocks noGrp="1"/>
+          </p:cNvSpPr>
+          <p:nvPr>
+            <p:ph idx="1"/>
+          </p:nvPr>
+        </p:nvSpPr>
+        <p:spPr>
+          <a:xfrm>
+            <a:off x="251520" y="1804333"/>
+            <a:ext cx="8640960" cy="4321831"/>
+          </a:xfrm>
+        </p:spPr>
+        <p:txBody>
+          <a:bodyPr/>
+          <a:lstStyle/>
+          <a:p>
+            <a:r>
+              <a:rPr lang="en-US" dirty="0">
+                <a:cs typeface="Calibri"/>
+              </a:rPr>
+              <a:t>The grid search process is usually combined with cross validation (</a:t>
+            </a:r>
+            <a:r>
+              <a:rPr lang="en-US" dirty="0">
+                <a:solidFill>
+                  <a:schemeClr val="tx2">
+                    <a:lumMod val="40000"/>
+                    <a:lumOff val="60000"/>
+                  </a:schemeClr>
+                </a:solidFill>
+                <a:cs typeface="Calibri"/>
+              </a:rPr>
+              <a:t>already covered</a:t>
+            </a:r>
+            <a:r>
+              <a:rPr lang="en-US" dirty="0">
+                <a:cs typeface="Calibri"/>
+              </a:rPr>
+              <a:t>)</a:t>
+            </a:r>
+            <a:endParaRPr lang="en-US" dirty="0"/>
+          </a:p>
+        </p:txBody>
+      </p:sp>
+      <p:sp>
+        <p:nvSpPr>
+          <p:cNvPr id="4" name="Slide Number Placeholder 3">
+            <a:extLst>
+              <a:ext uri="{FF2B5EF4-FFF2-40B4-BE49-F238E27FC236}">
+                <a16:creationId xmlns:a16="http://schemas.microsoft.com/office/drawing/2014/main" id="{B68BC167-BD63-466E-B433-FCA680A5FC5A}"/>
+              </a:ext>
+            </a:extLst>
+          </p:cNvPr>
+          <p:cNvSpPr>
+            <a:spLocks noGrp="1"/>
+          </p:cNvSpPr>
+          <p:nvPr>
+            <p:ph type="sldNum" sz="quarter" idx="10"/>
+          </p:nvPr>
+        </p:nvSpPr>
+        <p:spPr/>
+        <p:txBody>
+          <a:bodyPr/>
+          <a:lstStyle/>
+          <a:p>
+            <a:pPr>
+              <a:defRPr/>
+            </a:pPr>
+            <a:fld id="{953A5B41-6D74-47B9-8560-F73E964C6B20}" type="slidenum">
+              <a:rPr lang="en-GB" altLang="en-US"/>
+              <a:pPr>
+                <a:defRPr/>
+              </a:pPr>
+              <a:t>8</a:t>
+            </a:fld>
+            <a:endParaRPr lang="en-GB" altLang="en-US"/>
+          </a:p>
+        </p:txBody>
+      </p:sp>
+    </p:spTree>
+    <p:extLst>
+      <p:ext uri="{BB962C8B-B14F-4D97-AF65-F5344CB8AC3E}">
+        <p14:creationId xmlns:p14="http://schemas.microsoft.com/office/powerpoint/2010/main" val="3739775826"/>
       </p:ext>
     </p:extLst>
   </p:cSld>

</xml_diff>